<commit_message>
Update Does Robustness on ImageNet Transfer to Downstream Tasks.pptx
</commit_message>
<xml_diff>
--- a/Does Robustness on ImageNet Transfer to Downstream Tasks.pptx
+++ b/Does Robustness on ImageNet Transfer to Downstream Tasks.pptx
@@ -6,7 +6,7 @@
     <p:sldMasterId id="2147483671" r:id="rId2"/>
   </p:sldMasterIdLst>
   <p:notesMasterIdLst>
-    <p:notesMasterId r:id="rId24"/>
+    <p:notesMasterId r:id="rId32"/>
   </p:notesMasterIdLst>
   <p:sldIdLst>
     <p:sldId id="256" r:id="rId3"/>
@@ -30,6 +30,14 @@
     <p:sldId id="331" r:id="rId21"/>
     <p:sldId id="332" r:id="rId22"/>
     <p:sldId id="292" r:id="rId23"/>
+    <p:sldId id="338" r:id="rId24"/>
+    <p:sldId id="339" r:id="rId25"/>
+    <p:sldId id="337" r:id="rId26"/>
+    <p:sldId id="335" r:id="rId27"/>
+    <p:sldId id="336" r:id="rId28"/>
+    <p:sldId id="333" r:id="rId29"/>
+    <p:sldId id="334" r:id="rId30"/>
+    <p:sldId id="340" r:id="rId31"/>
   </p:sldIdLst>
   <p:sldSz cx="9144000" cy="5143500" type="screen16x9"/>
   <p:notesSz cx="6858000" cy="9144000"/>
@@ -283,7 +291,7 @@
 
 <file path=ppt/commentAuthors.xml><?xml version="1.0" encoding="utf-8"?>
 <p:cmAuthorLst xmlns:a="http://schemas.openxmlformats.org/drawingml/2006/main" xmlns:r="http://schemas.openxmlformats.org/officeDocument/2006/relationships" xmlns:p="http://schemas.openxmlformats.org/presentationml/2006/main">
-  <p:cmAuthor id="1" name="仲恩 鄧" initials="仲恩" lastIdx="1" clrIdx="0">
+  <p:cmAuthor id="1" name="仲恩 鄧" initials="仲恩" lastIdx="2" clrIdx="0">
     <p:extLst>
       <p:ext uri="{19B8F6BF-5375-455C-9EA6-DF929625EA0E}">
         <p15:presenceInfo xmlns:p15="http://schemas.microsoft.com/office/powerpoint/2012/main" userId="a30019152af3c3a5" providerId="Windows Live"/>
@@ -1053,8 +1061,8 @@
               <a:defRPr/>
             </a:pPr>
             <a:r>
-              <a:rPr lang="en-US" dirty="0"/>
-              <a:t>Swim</a:t>
+              <a:rPr lang="en-US" dirty="0" err="1"/>
+              <a:t>Swin</a:t>
             </a:r>
             <a:r>
               <a:rPr lang="zh-TW" altLang="en-US" dirty="0"/>
@@ -1413,35 +1421,7 @@
                 <a:effectLst/>
                 <a:latin typeface="Arial" panose="020B0604020202020204" pitchFamily="34" charset="0"/>
               </a:rPr>
-              <a:t>Transformer </a:t>
-            </a:r>
-            <a:r>
-              <a:rPr lang="en-US" altLang="zh-TW" b="0" i="0" dirty="0" err="1">
-                <a:effectLst/>
-                <a:latin typeface="Arial" panose="020B0604020202020204" pitchFamily="34" charset="0"/>
-              </a:rPr>
-              <a:t>architec</a:t>
-            </a:r>
-            <a:r>
-              <a:rPr lang="en-US" altLang="zh-TW" b="0" i="0" dirty="0">
-                <a:effectLst/>
-                <a:latin typeface="Arial" panose="020B0604020202020204" pitchFamily="34" charset="0"/>
-              </a:rPr>
-              <a:t>- </a:t>
-            </a:r>
-            <a:r>
-              <a:rPr lang="en-US" altLang="zh-TW" b="0" i="0" dirty="0" err="1">
-                <a:effectLst/>
-                <a:latin typeface="Arial" panose="020B0604020202020204" pitchFamily="34" charset="0"/>
-              </a:rPr>
-              <a:t>tures</a:t>
-            </a:r>
-            <a:r>
-              <a:rPr lang="en-US" altLang="zh-TW" b="0" i="0" dirty="0">
-                <a:effectLst/>
-                <a:latin typeface="Arial" panose="020B0604020202020204" pitchFamily="34" charset="0"/>
-              </a:rPr>
-              <a:t> might be more effective than CNNs</a:t>
+              <a:t>Transformer architectures might be more effective than CNNs</a:t>
             </a:r>
           </a:p>
           <a:p>
@@ -3500,7 +3480,7 @@
               <a:buFont typeface="Calibri"/>
               <a:buNone/>
             </a:pPr>
-            <a:endParaRPr/>
+            <a:endParaRPr dirty="0"/>
           </a:p>
         </p:txBody>
       </p:sp>
@@ -3900,6 +3880,371 @@
 </p:notes>
 </file>
 
+<file path=ppt/notesSlides/notesSlide22.xml><?xml version="1.0" encoding="utf-8"?>
+<p:notes xmlns:a="http://schemas.openxmlformats.org/drawingml/2006/main" xmlns:r="http://schemas.openxmlformats.org/officeDocument/2006/relationships" xmlns:p="http://schemas.openxmlformats.org/presentationml/2006/main">
+  <p:cSld>
+    <p:spTree>
+      <p:nvGrpSpPr>
+        <p:cNvPr id="1" name=""/>
+        <p:cNvGrpSpPr/>
+        <p:nvPr/>
+      </p:nvGrpSpPr>
+      <p:grpSpPr>
+        <a:xfrm>
+          <a:off x="0" y="0"/>
+          <a:ext cx="0" cy="0"/>
+          <a:chOff x="0" y="0"/>
+          <a:chExt cx="0" cy="0"/>
+        </a:xfrm>
+      </p:grpSpPr>
+      <p:sp>
+        <p:nvSpPr>
+          <p:cNvPr id="2" name="投影片影像版面配置區 1"/>
+          <p:cNvSpPr>
+            <a:spLocks noGrp="1" noRot="1" noChangeAspect="1"/>
+          </p:cNvSpPr>
+          <p:nvPr>
+            <p:ph type="sldImg"/>
+          </p:nvPr>
+        </p:nvSpPr>
+        <p:spPr/>
+      </p:sp>
+      <p:sp>
+        <p:nvSpPr>
+          <p:cNvPr id="3" name="備忘稿版面配置區 2"/>
+          <p:cNvSpPr>
+            <a:spLocks noGrp="1"/>
+          </p:cNvSpPr>
+          <p:nvPr>
+            <p:ph type="body" idx="1"/>
+          </p:nvPr>
+        </p:nvSpPr>
+        <p:spPr/>
+        <p:txBody>
+          <a:bodyPr/>
+          <a:lstStyle/>
+          <a:p>
+            <a:endParaRPr lang="zh-TW" altLang="en-US" dirty="0"/>
+          </a:p>
+        </p:txBody>
+      </p:sp>
+    </p:spTree>
+    <p:extLst>
+      <p:ext uri="{BB962C8B-B14F-4D97-AF65-F5344CB8AC3E}">
+        <p14:creationId xmlns:p14="http://schemas.microsoft.com/office/powerpoint/2010/main" val="3832237339"/>
+      </p:ext>
+    </p:extLst>
+  </p:cSld>
+  <p:clrMapOvr>
+    <a:masterClrMapping/>
+  </p:clrMapOvr>
+</p:notes>
+</file>
+
+<file path=ppt/notesSlides/notesSlide23.xml><?xml version="1.0" encoding="utf-8"?>
+<p:notes xmlns:a="http://schemas.openxmlformats.org/drawingml/2006/main" xmlns:r="http://schemas.openxmlformats.org/officeDocument/2006/relationships" xmlns:p="http://schemas.openxmlformats.org/presentationml/2006/main">
+  <p:cSld>
+    <p:spTree>
+      <p:nvGrpSpPr>
+        <p:cNvPr id="1" name=""/>
+        <p:cNvGrpSpPr/>
+        <p:nvPr/>
+      </p:nvGrpSpPr>
+      <p:grpSpPr>
+        <a:xfrm>
+          <a:off x="0" y="0"/>
+          <a:ext cx="0" cy="0"/>
+          <a:chOff x="0" y="0"/>
+          <a:chExt cx="0" cy="0"/>
+        </a:xfrm>
+      </p:grpSpPr>
+      <p:sp>
+        <p:nvSpPr>
+          <p:cNvPr id="2" name="投影片影像版面配置區 1"/>
+          <p:cNvSpPr>
+            <a:spLocks noGrp="1" noRot="1" noChangeAspect="1"/>
+          </p:cNvSpPr>
+          <p:nvPr>
+            <p:ph type="sldImg"/>
+          </p:nvPr>
+        </p:nvSpPr>
+        <p:spPr/>
+      </p:sp>
+      <p:sp>
+        <p:nvSpPr>
+          <p:cNvPr id="3" name="備忘稿版面配置區 2"/>
+          <p:cNvSpPr>
+            <a:spLocks noGrp="1"/>
+          </p:cNvSpPr>
+          <p:nvPr>
+            <p:ph type="body" idx="1"/>
+          </p:nvPr>
+        </p:nvSpPr>
+        <p:spPr/>
+        <p:txBody>
+          <a:bodyPr/>
+          <a:lstStyle/>
+          <a:p>
+            <a:endParaRPr lang="zh-TW" altLang="en-US" dirty="0"/>
+          </a:p>
+        </p:txBody>
+      </p:sp>
+    </p:spTree>
+    <p:extLst>
+      <p:ext uri="{BB962C8B-B14F-4D97-AF65-F5344CB8AC3E}">
+        <p14:creationId xmlns:p14="http://schemas.microsoft.com/office/powerpoint/2010/main" val="3070555558"/>
+      </p:ext>
+    </p:extLst>
+  </p:cSld>
+  <p:clrMapOvr>
+    <a:masterClrMapping/>
+  </p:clrMapOvr>
+</p:notes>
+</file>
+
+<file path=ppt/notesSlides/notesSlide24.xml><?xml version="1.0" encoding="utf-8"?>
+<p:notes xmlns:a="http://schemas.openxmlformats.org/drawingml/2006/main" xmlns:r="http://schemas.openxmlformats.org/officeDocument/2006/relationships" xmlns:p="http://schemas.openxmlformats.org/presentationml/2006/main">
+  <p:cSld>
+    <p:spTree>
+      <p:nvGrpSpPr>
+        <p:cNvPr id="1" name=""/>
+        <p:cNvGrpSpPr/>
+        <p:nvPr/>
+      </p:nvGrpSpPr>
+      <p:grpSpPr>
+        <a:xfrm>
+          <a:off x="0" y="0"/>
+          <a:ext cx="0" cy="0"/>
+          <a:chOff x="0" y="0"/>
+          <a:chExt cx="0" cy="0"/>
+        </a:xfrm>
+      </p:grpSpPr>
+      <p:sp>
+        <p:nvSpPr>
+          <p:cNvPr id="2" name="投影片影像版面配置區 1"/>
+          <p:cNvSpPr>
+            <a:spLocks noGrp="1" noRot="1" noChangeAspect="1"/>
+          </p:cNvSpPr>
+          <p:nvPr>
+            <p:ph type="sldImg"/>
+          </p:nvPr>
+        </p:nvSpPr>
+        <p:spPr/>
+      </p:sp>
+      <p:sp>
+        <p:nvSpPr>
+          <p:cNvPr id="3" name="備忘稿版面配置區 2"/>
+          <p:cNvSpPr>
+            <a:spLocks noGrp="1"/>
+          </p:cNvSpPr>
+          <p:nvPr>
+            <p:ph type="body" idx="1"/>
+          </p:nvPr>
+        </p:nvSpPr>
+        <p:spPr/>
+        <p:txBody>
+          <a:bodyPr/>
+          <a:lstStyle/>
+          <a:p>
+            <a:endParaRPr lang="zh-TW" altLang="en-US" dirty="0"/>
+          </a:p>
+        </p:txBody>
+      </p:sp>
+    </p:spTree>
+    <p:extLst>
+      <p:ext uri="{BB962C8B-B14F-4D97-AF65-F5344CB8AC3E}">
+        <p14:creationId xmlns:p14="http://schemas.microsoft.com/office/powerpoint/2010/main" val="295580107"/>
+      </p:ext>
+    </p:extLst>
+  </p:cSld>
+  <p:clrMapOvr>
+    <a:masterClrMapping/>
+  </p:clrMapOvr>
+</p:notes>
+</file>
+
+<file path=ppt/notesSlides/notesSlide25.xml><?xml version="1.0" encoding="utf-8"?>
+<p:notes xmlns:a="http://schemas.openxmlformats.org/drawingml/2006/main" xmlns:r="http://schemas.openxmlformats.org/officeDocument/2006/relationships" xmlns:p="http://schemas.openxmlformats.org/presentationml/2006/main" showMasterSp="0" showMasterPhAnim="0">
+  <p:cSld>
+    <p:spTree>
+      <p:nvGrpSpPr>
+        <p:cNvPr id="1" name="Shape 135"/>
+        <p:cNvGrpSpPr/>
+        <p:nvPr/>
+      </p:nvGrpSpPr>
+      <p:grpSpPr>
+        <a:xfrm>
+          <a:off x="0" y="0"/>
+          <a:ext cx="0" cy="0"/>
+          <a:chOff x="0" y="0"/>
+          <a:chExt cx="0" cy="0"/>
+        </a:xfrm>
+      </p:grpSpPr>
+      <p:sp>
+        <p:nvSpPr>
+          <p:cNvPr id="136" name="Google Shape;136;g1144437607e_2_96:notes"/>
+          <p:cNvSpPr>
+            <a:spLocks noGrp="1" noRot="1" noChangeAspect="1"/>
+          </p:cNvSpPr>
+          <p:nvPr>
+            <p:ph type="sldImg" idx="2"/>
+          </p:nvPr>
+        </p:nvSpPr>
+        <p:spPr>
+          <a:xfrm>
+            <a:off x="685800" y="1143000"/>
+            <a:ext cx="5486400" cy="3086100"/>
+          </a:xfrm>
+          <a:custGeom>
+            <a:avLst/>
+            <a:gdLst/>
+            <a:ahLst/>
+            <a:cxnLst/>
+            <a:rect l="l" t="t" r="r" b="b"/>
+            <a:pathLst>
+              <a:path w="120000" h="120000" extrusionOk="0">
+                <a:moveTo>
+                  <a:pt x="0" y="0"/>
+                </a:moveTo>
+                <a:lnTo>
+                  <a:pt x="120000" y="0"/>
+                </a:lnTo>
+                <a:lnTo>
+                  <a:pt x="120000" y="120000"/>
+                </a:lnTo>
+                <a:lnTo>
+                  <a:pt x="0" y="120000"/>
+                </a:lnTo>
+                <a:close/>
+              </a:path>
+            </a:pathLst>
+          </a:custGeom>
+          <a:noFill/>
+          <a:ln w="12700" cap="flat" cmpd="sng">
+            <a:solidFill>
+              <a:srgbClr val="000000"/>
+            </a:solidFill>
+            <a:prstDash val="solid"/>
+            <a:round/>
+            <a:headEnd type="none" w="sm" len="sm"/>
+            <a:tailEnd type="none" w="sm" len="sm"/>
+          </a:ln>
+        </p:spPr>
+      </p:sp>
+      <p:sp>
+        <p:nvSpPr>
+          <p:cNvPr id="137" name="Google Shape;137;g1144437607e_2_96:notes"/>
+          <p:cNvSpPr txBox="1">
+            <a:spLocks noGrp="1"/>
+          </p:cNvSpPr>
+          <p:nvPr>
+            <p:ph type="body" idx="1"/>
+          </p:nvPr>
+        </p:nvSpPr>
+        <p:spPr>
+          <a:xfrm>
+            <a:off x="685800" y="4400550"/>
+            <a:ext cx="5486400" cy="3600600"/>
+          </a:xfrm>
+          <a:prstGeom prst="rect">
+            <a:avLst/>
+          </a:prstGeom>
+          <a:noFill/>
+          <a:ln>
+            <a:noFill/>
+          </a:ln>
+        </p:spPr>
+        <p:txBody>
+          <a:bodyPr spcFirstLastPara="1" wrap="square" lIns="91425" tIns="45700" rIns="91425" bIns="45700" anchor="t" anchorCtr="0">
+            <a:noAutofit/>
+          </a:bodyPr>
+          <a:lstStyle/>
+          <a:p>
+            <a:pPr marL="0" marR="0" lvl="0" indent="0" algn="l" defTabSz="914400" rtl="0" eaLnBrk="1" fontAlgn="auto" latinLnBrk="0" hangingPunct="1">
+              <a:lnSpc>
+                <a:spcPct val="100000"/>
+              </a:lnSpc>
+              <a:spcBef>
+                <a:spcPts val="0"/>
+              </a:spcBef>
+              <a:spcAft>
+                <a:spcPts val="0"/>
+              </a:spcAft>
+              <a:buClr>
+                <a:schemeClr val="dk1"/>
+              </a:buClr>
+              <a:buSzPts val="1200"/>
+              <a:buFont typeface="Calibri"/>
+              <a:buNone/>
+              <a:tabLst/>
+              <a:defRPr/>
+            </a:pPr>
+            <a:endParaRPr lang="en-US" altLang="zh-TW" b="0" i="0" dirty="0">
+              <a:effectLst/>
+              <a:latin typeface="Arial" panose="020B0604020202020204" pitchFamily="34" charset="0"/>
+            </a:endParaRPr>
+          </a:p>
+        </p:txBody>
+      </p:sp>
+      <p:sp>
+        <p:nvSpPr>
+          <p:cNvPr id="138" name="Google Shape;138;g1144437607e_2_96:notes"/>
+          <p:cNvSpPr txBox="1">
+            <a:spLocks noGrp="1"/>
+          </p:cNvSpPr>
+          <p:nvPr>
+            <p:ph type="sldNum" idx="12"/>
+          </p:nvPr>
+        </p:nvSpPr>
+        <p:spPr>
+          <a:xfrm>
+            <a:off x="3884613" y="8685213"/>
+            <a:ext cx="2971800" cy="458700"/>
+          </a:xfrm>
+          <a:prstGeom prst="rect">
+            <a:avLst/>
+          </a:prstGeom>
+          <a:noFill/>
+          <a:ln>
+            <a:noFill/>
+          </a:ln>
+        </p:spPr>
+        <p:txBody>
+          <a:bodyPr spcFirstLastPara="1" wrap="square" lIns="91425" tIns="45700" rIns="91425" bIns="45700" anchor="b" anchorCtr="0">
+            <a:noAutofit/>
+          </a:bodyPr>
+          <a:lstStyle/>
+          <a:p>
+            <a:pPr marL="0" lvl="0" indent="0" algn="r" rtl="0">
+              <a:spcBef>
+                <a:spcPts val="0"/>
+              </a:spcBef>
+              <a:spcAft>
+                <a:spcPts val="0"/>
+              </a:spcAft>
+              <a:buNone/>
+            </a:pPr>
+            <a:fld id="{00000000-1234-1234-1234-123412341234}" type="slidenum">
+              <a:rPr lang="en-US" altLang="zh-TW"/>
+              <a:t>29</a:t>
+            </a:fld>
+            <a:endParaRPr/>
+          </a:p>
+        </p:txBody>
+      </p:sp>
+    </p:spTree>
+    <p:extLst>
+      <p:ext uri="{BB962C8B-B14F-4D97-AF65-F5344CB8AC3E}">
+        <p14:creationId xmlns:p14="http://schemas.microsoft.com/office/powerpoint/2010/main" val="195477101"/>
+      </p:ext>
+    </p:extLst>
+  </p:cSld>
+  <p:clrMapOvr>
+    <a:masterClrMapping/>
+  </p:clrMapOvr>
+</p:notes>
+</file>
+
 <file path=ppt/notesSlides/notesSlide3.xml><?xml version="1.0" encoding="utf-8"?>
 <p:notes xmlns:a="http://schemas.openxmlformats.org/drawingml/2006/main" xmlns:r="http://schemas.openxmlformats.org/officeDocument/2006/relationships" xmlns:p="http://schemas.openxmlformats.org/presentationml/2006/main" showMasterSp="0" showMasterPhAnim="0">
   <p:cSld>
@@ -4845,7 +5190,7 @@
                   <a:schemeClr val="tx1"/>
                 </a:solidFill>
               </a:rPr>
-              <a:t> ，者也導致</a:t>
+              <a:t> ，者也導致失去主幹的</a:t>
             </a:r>
             <a:r>
               <a:rPr lang="en-US" altLang="zh-TW" sz="1100" dirty="0">
@@ -4853,37 +5198,8 @@
                   <a:schemeClr val="tx1"/>
                 </a:solidFill>
               </a:rPr>
-              <a:t>classification</a:t>
+              <a:t>robust</a:t>
             </a:r>
-            <a:r>
-              <a:rPr lang="zh-TW" altLang="en-US" sz="1100" dirty="0">
-                <a:solidFill>
-                  <a:schemeClr val="tx1"/>
-                </a:solidFill>
-              </a:rPr>
-              <a:t>的</a:t>
-            </a:r>
-            <a:r>
-              <a:rPr lang="en-US" altLang="zh-TW" sz="1100" dirty="0">
-                <a:solidFill>
-                  <a:schemeClr val="tx1"/>
-                </a:solidFill>
-              </a:rPr>
-              <a:t>robust </a:t>
-            </a:r>
-            <a:r>
-              <a:rPr lang="zh-TW" altLang="en-US" sz="1100" dirty="0">
-                <a:solidFill>
-                  <a:schemeClr val="tx1"/>
-                </a:solidFill>
-              </a:rPr>
-              <a:t>失去</a:t>
-            </a:r>
-            <a:endParaRPr lang="en-US" altLang="zh-TW" sz="1100" dirty="0">
-              <a:solidFill>
-                <a:schemeClr val="tx1"/>
-              </a:solidFill>
-            </a:endParaRPr>
           </a:p>
           <a:p>
             <a:pPr marL="0" marR="0" lvl="0" indent="0" algn="l" rtl="0">
@@ -24702,8 +25018,8 @@
         </p:nvSpPr>
         <p:spPr>
           <a:xfrm>
-            <a:off x="471900" y="886850"/>
-            <a:ext cx="8252100" cy="3508623"/>
+            <a:off x="471899" y="886850"/>
+            <a:ext cx="8611519" cy="3693288"/>
           </a:xfrm>
           <a:prstGeom prst="rect">
             <a:avLst/>
@@ -24737,7 +25053,7 @@
               <a:buAutoNum type="arabicPeriod"/>
             </a:pPr>
             <a:r>
-              <a:rPr lang="en-US" altLang="zh-TW" sz="2400" b="0" i="0" dirty="0">
+              <a:rPr lang="en-US" altLang="zh-TW" sz="1600" b="0" i="0" dirty="0">
                 <a:effectLst/>
                 <a:latin typeface="Arial" panose="020B0604020202020204" pitchFamily="34" charset="0"/>
               </a:rPr>
@@ -24763,11 +25079,11 @@
               <a:buAutoNum type="arabicPeriod"/>
             </a:pPr>
             <a:r>
-              <a:rPr lang="en-US" altLang="zh-TW" sz="2400" b="0" i="0" dirty="0">
+              <a:rPr lang="en-US" altLang="zh-TW" sz="1600" b="0" i="0" dirty="0">
                 <a:effectLst/>
                 <a:latin typeface="Arial" panose="020B0604020202020204" pitchFamily="34" charset="0"/>
               </a:rPr>
-              <a:t>Related Work</a:t>
+              <a:t>Background</a:t>
             </a:r>
           </a:p>
           <a:p>
@@ -24789,10 +25105,10 @@
               <a:buAutoNum type="arabicPeriod"/>
             </a:pPr>
             <a:r>
-              <a:rPr lang="en-US" altLang="zh-TW" sz="2400" dirty="0">
+              <a:rPr lang="en-US" altLang="zh-TW" sz="1600" dirty="0">
                 <a:latin typeface="Arial" panose="020B0604020202020204" pitchFamily="34" charset="0"/>
               </a:rPr>
-              <a:t>Approach</a:t>
+              <a:t>Fixed-Feature Transfer Learning</a:t>
             </a:r>
           </a:p>
           <a:p>
@@ -24814,11 +25130,11 @@
               <a:buAutoNum type="arabicPeriod"/>
             </a:pPr>
             <a:r>
-              <a:rPr lang="en-US" altLang="zh-TW" sz="2400" b="0" i="0" dirty="0">
+              <a:rPr lang="en-US" altLang="zh-TW" sz="1600" b="0" i="0" dirty="0">
                 <a:effectLst/>
                 <a:latin typeface="Arial" panose="020B0604020202020204" pitchFamily="34" charset="0"/>
               </a:rPr>
-              <a:t>ImageNet Experiments</a:t>
+              <a:t>Full-Network Transfer Learning</a:t>
             </a:r>
           </a:p>
           <a:p>
@@ -24840,11 +25156,11 @@
               <a:buAutoNum type="arabicPeriod"/>
             </a:pPr>
             <a:r>
-              <a:rPr lang="en-US" altLang="zh-TW" sz="2400" b="0" i="0" dirty="0">
+              <a:rPr lang="en-US" altLang="zh-TW" sz="1600" b="0" i="0" dirty="0">
                 <a:effectLst/>
                 <a:latin typeface="Arial" panose="020B0604020202020204" pitchFamily="34" charset="0"/>
               </a:rPr>
-              <a:t>Transfer Learning Experiments</a:t>
+              <a:t>Do Larger Models Transfer Robustness Better?</a:t>
             </a:r>
           </a:p>
           <a:p>
@@ -24866,13 +25182,91 @@
               <a:buAutoNum type="arabicPeriod"/>
             </a:pPr>
             <a:r>
-              <a:rPr lang="en-US" sz="2400" dirty="0">
+              <a:rPr lang="en-US" sz="1600" dirty="0" err="1">
                 <a:latin typeface="Arial" panose="020B0604020202020204" pitchFamily="34" charset="0"/>
                 <a:sym typeface="Microsoft JhengHei"/>
               </a:rPr>
-              <a:t>Discussion and Conclusion</a:t>
+              <a:t>Adversarially</a:t>
             </a:r>
-            <a:endParaRPr sz="2400" dirty="0">
+            <a:r>
+              <a:rPr lang="en-US" sz="1600" dirty="0">
+                <a:latin typeface="Arial" panose="020B0604020202020204" pitchFamily="34" charset="0"/>
+                <a:sym typeface="Microsoft JhengHei"/>
+              </a:rPr>
+              <a:t>-trained Networks do not Transfer Robustness to Downstream Tasks</a:t>
+            </a:r>
+          </a:p>
+          <a:p>
+            <a:pPr marL="457200" lvl="0" indent="-317500" algn="l" rtl="0">
+              <a:lnSpc>
+                <a:spcPct val="150000"/>
+              </a:lnSpc>
+              <a:spcBef>
+                <a:spcPts val="0"/>
+              </a:spcBef>
+              <a:spcAft>
+                <a:spcPts val="0"/>
+              </a:spcAft>
+              <a:buClr>
+                <a:schemeClr val="dk1"/>
+              </a:buClr>
+              <a:buSzPts val="1400"/>
+              <a:buFont typeface="Microsoft JhengHei"/>
+              <a:buAutoNum type="arabicPeriod"/>
+            </a:pPr>
+            <a:r>
+              <a:rPr lang="en-US" sz="1600" dirty="0">
+                <a:latin typeface="Arial" panose="020B0604020202020204" pitchFamily="34" charset="0"/>
+                <a:sym typeface="Microsoft JhengHei"/>
+              </a:rPr>
+              <a:t>Related Works and Discussions</a:t>
+            </a:r>
+          </a:p>
+          <a:p>
+            <a:pPr marL="457200" lvl="0" indent="-317500" algn="l" rtl="0">
+              <a:lnSpc>
+                <a:spcPct val="150000"/>
+              </a:lnSpc>
+              <a:spcBef>
+                <a:spcPts val="0"/>
+              </a:spcBef>
+              <a:spcAft>
+                <a:spcPts val="0"/>
+              </a:spcAft>
+              <a:buClr>
+                <a:schemeClr val="dk1"/>
+              </a:buClr>
+              <a:buSzPts val="1400"/>
+              <a:buFont typeface="Microsoft JhengHei"/>
+              <a:buAutoNum type="arabicPeriod"/>
+            </a:pPr>
+            <a:r>
+              <a:rPr lang="en-US" sz="1600" dirty="0">
+                <a:latin typeface="Arial" panose="020B0604020202020204" pitchFamily="34" charset="0"/>
+                <a:sym typeface="Microsoft JhengHei"/>
+              </a:rPr>
+              <a:t>Conclusions</a:t>
+            </a:r>
+          </a:p>
+          <a:p>
+            <a:pPr marL="457200" lvl="0" indent="-317500" algn="l" rtl="0">
+              <a:lnSpc>
+                <a:spcPct val="150000"/>
+              </a:lnSpc>
+              <a:spcBef>
+                <a:spcPts val="0"/>
+              </a:spcBef>
+              <a:spcAft>
+                <a:spcPts val="0"/>
+              </a:spcAft>
+              <a:buClr>
+                <a:schemeClr val="dk1"/>
+              </a:buClr>
+              <a:buSzPts val="1400"/>
+              <a:buFont typeface="Microsoft JhengHei"/>
+              <a:buAutoNum type="arabicPeriod"/>
+            </a:pPr>
+            <a:endParaRPr lang="en-US" sz="2400" dirty="0">
               <a:latin typeface="Arial" panose="020B0604020202020204" pitchFamily="34" charset="0"/>
               <a:sym typeface="Microsoft JhengHei"/>
             </a:endParaRPr>
@@ -25714,6 +26108,1971 @@
 </p:sld>
 </file>
 
+<file path=ppt/slides/slide22.xml><?xml version="1.0" encoding="utf-8"?>
+<p:sld xmlns:a="http://schemas.openxmlformats.org/drawingml/2006/main" xmlns:r="http://schemas.openxmlformats.org/officeDocument/2006/relationships" xmlns:p="http://schemas.openxmlformats.org/presentationml/2006/main">
+  <p:cSld>
+    <p:spTree>
+      <p:nvGrpSpPr>
+        <p:cNvPr id="1" name=""/>
+        <p:cNvGrpSpPr/>
+        <p:nvPr/>
+      </p:nvGrpSpPr>
+      <p:grpSpPr>
+        <a:xfrm>
+          <a:off x="0" y="0"/>
+          <a:ext cx="0" cy="0"/>
+          <a:chOff x="0" y="0"/>
+          <a:chExt cx="0" cy="0"/>
+        </a:xfrm>
+      </p:grpSpPr>
+      <p:sp>
+        <p:nvSpPr>
+          <p:cNvPr id="2" name="標題 1">
+            <a:extLst>
+              <a:ext uri="{FF2B5EF4-FFF2-40B4-BE49-F238E27FC236}">
+                <a16:creationId xmlns:a16="http://schemas.microsoft.com/office/drawing/2014/main" id="{D730F23C-EDD2-8ACD-5A38-2122055EBAF9}"/>
+              </a:ext>
+            </a:extLst>
+          </p:cNvPr>
+          <p:cNvSpPr>
+            <a:spLocks noGrp="1"/>
+          </p:cNvSpPr>
+          <p:nvPr>
+            <p:ph type="title"/>
+          </p:nvPr>
+        </p:nvSpPr>
+        <p:spPr/>
+        <p:txBody>
+          <a:bodyPr/>
+          <a:lstStyle/>
+          <a:p>
+            <a:endParaRPr lang="zh-TW" altLang="en-US" dirty="0"/>
+          </a:p>
+        </p:txBody>
+      </p:sp>
+      <p:sp>
+        <p:nvSpPr>
+          <p:cNvPr id="3" name="文字版面配置區 2">
+            <a:extLst>
+              <a:ext uri="{FF2B5EF4-FFF2-40B4-BE49-F238E27FC236}">
+                <a16:creationId xmlns:a16="http://schemas.microsoft.com/office/drawing/2014/main" id="{D288B25D-189E-C7AC-8A91-00607C72424C}"/>
+              </a:ext>
+            </a:extLst>
+          </p:cNvPr>
+          <p:cNvSpPr>
+            <a:spLocks noGrp="1"/>
+          </p:cNvSpPr>
+          <p:nvPr>
+            <p:ph type="body" idx="1"/>
+          </p:nvPr>
+        </p:nvSpPr>
+        <p:spPr/>
+        <p:txBody>
+          <a:bodyPr/>
+          <a:lstStyle/>
+          <a:p>
+            <a:endParaRPr lang="zh-TW" altLang="en-US" dirty="0"/>
+          </a:p>
+        </p:txBody>
+      </p:sp>
+      <p:pic>
+        <p:nvPicPr>
+          <p:cNvPr id="4098" name="Picture 2" descr="preview">
+            <a:extLst>
+              <a:ext uri="{FF2B5EF4-FFF2-40B4-BE49-F238E27FC236}">
+                <a16:creationId xmlns:a16="http://schemas.microsoft.com/office/drawing/2014/main" id="{D547DEAE-7B41-5DEB-F4FA-0748D50B5A7F}"/>
+              </a:ext>
+            </a:extLst>
+          </p:cNvPr>
+          <p:cNvPicPr>
+            <a:picLocks noChangeAspect="1" noChangeArrowheads="1"/>
+          </p:cNvPicPr>
+          <p:nvPr/>
+        </p:nvPicPr>
+        <p:blipFill>
+          <a:blip r:embed="rId3">
+            <a:extLst>
+              <a:ext uri="{28A0092B-C50C-407E-A947-70E740481C1C}">
+                <a14:useLocalDpi xmlns:a14="http://schemas.microsoft.com/office/drawing/2010/main" val="0"/>
+              </a:ext>
+            </a:extLst>
+          </a:blip>
+          <a:srcRect/>
+          <a:stretch>
+            <a:fillRect/>
+          </a:stretch>
+        </p:blipFill>
+        <p:spPr bwMode="auto">
+          <a:xfrm>
+            <a:off x="204107" y="27467"/>
+            <a:ext cx="5397451" cy="3040687"/>
+          </a:xfrm>
+          <a:prstGeom prst="rect">
+            <a:avLst/>
+          </a:prstGeom>
+          <a:noFill/>
+          <a:extLst>
+            <a:ext uri="{909E8E84-426E-40DD-AFC4-6F175D3DCCD1}">
+              <a14:hiddenFill xmlns:a14="http://schemas.microsoft.com/office/drawing/2010/main">
+                <a:solidFill>
+                  <a:srgbClr val="FFFFFF"/>
+                </a:solidFill>
+              </a14:hiddenFill>
+            </a:ext>
+          </a:extLst>
+        </p:spPr>
+      </p:pic>
+      <p:pic>
+        <p:nvPicPr>
+          <p:cNvPr id="5" name="圖片 4">
+            <a:extLst>
+              <a:ext uri="{FF2B5EF4-FFF2-40B4-BE49-F238E27FC236}">
+                <a16:creationId xmlns:a16="http://schemas.microsoft.com/office/drawing/2014/main" id="{6123A9CA-8DC9-A934-869A-5CC30ACF845D}"/>
+              </a:ext>
+            </a:extLst>
+          </p:cNvPr>
+          <p:cNvPicPr>
+            <a:picLocks noChangeAspect="1"/>
+          </p:cNvPicPr>
+          <p:nvPr/>
+        </p:nvPicPr>
+        <p:blipFill>
+          <a:blip r:embed="rId4"/>
+          <a:stretch>
+            <a:fillRect/>
+          </a:stretch>
+        </p:blipFill>
+        <p:spPr>
+          <a:xfrm>
+            <a:off x="3278136" y="3118756"/>
+            <a:ext cx="5757863" cy="2024743"/>
+          </a:xfrm>
+          <a:prstGeom prst="rect">
+            <a:avLst/>
+          </a:prstGeom>
+        </p:spPr>
+      </p:pic>
+    </p:spTree>
+    <p:extLst>
+      <p:ext uri="{BB962C8B-B14F-4D97-AF65-F5344CB8AC3E}">
+        <p14:creationId xmlns:p14="http://schemas.microsoft.com/office/powerpoint/2010/main" val="3893346303"/>
+      </p:ext>
+    </p:extLst>
+  </p:cSld>
+  <p:clrMapOvr>
+    <a:masterClrMapping/>
+  </p:clrMapOvr>
+</p:sld>
+</file>
+
+<file path=ppt/slides/slide23.xml><?xml version="1.0" encoding="utf-8"?>
+<p:sld xmlns:a="http://schemas.openxmlformats.org/drawingml/2006/main" xmlns:r="http://schemas.openxmlformats.org/officeDocument/2006/relationships" xmlns:p="http://schemas.openxmlformats.org/presentationml/2006/main">
+  <p:cSld>
+    <p:spTree>
+      <p:nvGrpSpPr>
+        <p:cNvPr id="1" name=""/>
+        <p:cNvGrpSpPr/>
+        <p:nvPr/>
+      </p:nvGrpSpPr>
+      <p:grpSpPr>
+        <a:xfrm>
+          <a:off x="0" y="0"/>
+          <a:ext cx="0" cy="0"/>
+          <a:chOff x="0" y="0"/>
+          <a:chExt cx="0" cy="0"/>
+        </a:xfrm>
+      </p:grpSpPr>
+      <p:pic>
+        <p:nvPicPr>
+          <p:cNvPr id="5122" name="Picture 2" descr="Vision Transformer Explained | Papers With Code">
+            <a:extLst>
+              <a:ext uri="{FF2B5EF4-FFF2-40B4-BE49-F238E27FC236}">
+                <a16:creationId xmlns:a16="http://schemas.microsoft.com/office/drawing/2014/main" id="{F713E5C6-E3E1-8CF0-9E45-32DC4EA22E1F}"/>
+              </a:ext>
+            </a:extLst>
+          </p:cNvPr>
+          <p:cNvPicPr>
+            <a:picLocks noChangeAspect="1" noChangeArrowheads="1"/>
+          </p:cNvPicPr>
+          <p:nvPr/>
+        </p:nvPicPr>
+        <p:blipFill>
+          <a:blip r:embed="rId2">
+            <a:extLst>
+              <a:ext uri="{28A0092B-C50C-407E-A947-70E740481C1C}">
+                <a14:useLocalDpi xmlns:a14="http://schemas.microsoft.com/office/drawing/2010/main" val="0"/>
+              </a:ext>
+            </a:extLst>
+          </a:blip>
+          <a:srcRect/>
+          <a:stretch>
+            <a:fillRect/>
+          </a:stretch>
+        </p:blipFill>
+        <p:spPr bwMode="auto">
+          <a:xfrm>
+            <a:off x="175532" y="906234"/>
+            <a:ext cx="5169867" cy="3929743"/>
+          </a:xfrm>
+          <a:prstGeom prst="rect">
+            <a:avLst/>
+          </a:prstGeom>
+          <a:noFill/>
+          <a:extLst>
+            <a:ext uri="{909E8E84-426E-40DD-AFC4-6F175D3DCCD1}">
+              <a14:hiddenFill xmlns:a14="http://schemas.microsoft.com/office/drawing/2010/main">
+                <a:solidFill>
+                  <a:srgbClr val="FFFFFF"/>
+                </a:solidFill>
+              </a14:hiddenFill>
+            </a:ext>
+          </a:extLst>
+        </p:spPr>
+      </p:pic>
+      <p:cxnSp>
+        <p:nvCxnSpPr>
+          <p:cNvPr id="6" name="直線單箭頭接點 5">
+            <a:extLst>
+              <a:ext uri="{FF2B5EF4-FFF2-40B4-BE49-F238E27FC236}">
+                <a16:creationId xmlns:a16="http://schemas.microsoft.com/office/drawing/2014/main" id="{FCF3064B-3E91-90A7-0AF0-4ADEA3A61458}"/>
+              </a:ext>
+            </a:extLst>
+          </p:cNvPr>
+          <p:cNvCxnSpPr/>
+          <p:nvPr/>
+        </p:nvCxnSpPr>
+        <p:spPr>
+          <a:xfrm flipV="1">
+            <a:off x="2237014" y="1436914"/>
+            <a:ext cx="0" cy="1036864"/>
+          </a:xfrm>
+          <a:prstGeom prst="straightConnector1">
+            <a:avLst/>
+          </a:prstGeom>
+          <a:ln>
+            <a:solidFill>
+              <a:srgbClr val="FF0000"/>
+            </a:solidFill>
+            <a:tailEnd type="triangle"/>
+          </a:ln>
+        </p:spPr>
+        <p:style>
+          <a:lnRef idx="1">
+            <a:schemeClr val="accent1"/>
+          </a:lnRef>
+          <a:fillRef idx="0">
+            <a:schemeClr val="accent1"/>
+          </a:fillRef>
+          <a:effectRef idx="0">
+            <a:schemeClr val="accent1"/>
+          </a:effectRef>
+          <a:fontRef idx="minor">
+            <a:schemeClr val="tx1"/>
+          </a:fontRef>
+        </p:style>
+      </p:cxnSp>
+      <p:cxnSp>
+        <p:nvCxnSpPr>
+          <p:cNvPr id="7" name="直線單箭頭接點 6">
+            <a:extLst>
+              <a:ext uri="{FF2B5EF4-FFF2-40B4-BE49-F238E27FC236}">
+                <a16:creationId xmlns:a16="http://schemas.microsoft.com/office/drawing/2014/main" id="{7EE4121C-A6D8-6A18-D993-D73BC3CCDF5D}"/>
+              </a:ext>
+            </a:extLst>
+          </p:cNvPr>
+          <p:cNvCxnSpPr/>
+          <p:nvPr/>
+        </p:nvCxnSpPr>
+        <p:spPr>
+          <a:xfrm flipV="1">
+            <a:off x="2552699" y="1436914"/>
+            <a:ext cx="0" cy="1036864"/>
+          </a:xfrm>
+          <a:prstGeom prst="straightConnector1">
+            <a:avLst/>
+          </a:prstGeom>
+          <a:ln>
+            <a:solidFill>
+              <a:srgbClr val="FF0000"/>
+            </a:solidFill>
+            <a:tailEnd type="triangle"/>
+          </a:ln>
+        </p:spPr>
+        <p:style>
+          <a:lnRef idx="1">
+            <a:schemeClr val="accent1"/>
+          </a:lnRef>
+          <a:fillRef idx="0">
+            <a:schemeClr val="accent1"/>
+          </a:fillRef>
+          <a:effectRef idx="0">
+            <a:schemeClr val="accent1"/>
+          </a:effectRef>
+          <a:fontRef idx="minor">
+            <a:schemeClr val="tx1"/>
+          </a:fontRef>
+        </p:style>
+      </p:cxnSp>
+      <p:cxnSp>
+        <p:nvCxnSpPr>
+          <p:cNvPr id="8" name="直線單箭頭接點 7">
+            <a:extLst>
+              <a:ext uri="{FF2B5EF4-FFF2-40B4-BE49-F238E27FC236}">
+                <a16:creationId xmlns:a16="http://schemas.microsoft.com/office/drawing/2014/main" id="{8152E00B-9760-5CBD-30BA-6CB0EBE2B492}"/>
+              </a:ext>
+            </a:extLst>
+          </p:cNvPr>
+          <p:cNvCxnSpPr/>
+          <p:nvPr/>
+        </p:nvCxnSpPr>
+        <p:spPr>
+          <a:xfrm flipV="1">
+            <a:off x="2892878" y="1436914"/>
+            <a:ext cx="0" cy="1036864"/>
+          </a:xfrm>
+          <a:prstGeom prst="straightConnector1">
+            <a:avLst/>
+          </a:prstGeom>
+          <a:ln>
+            <a:solidFill>
+              <a:srgbClr val="FF0000"/>
+            </a:solidFill>
+            <a:tailEnd type="triangle"/>
+          </a:ln>
+        </p:spPr>
+        <p:style>
+          <a:lnRef idx="1">
+            <a:schemeClr val="accent1"/>
+          </a:lnRef>
+          <a:fillRef idx="0">
+            <a:schemeClr val="accent1"/>
+          </a:fillRef>
+          <a:effectRef idx="0">
+            <a:schemeClr val="accent1"/>
+          </a:effectRef>
+          <a:fontRef idx="minor">
+            <a:schemeClr val="tx1"/>
+          </a:fontRef>
+        </p:style>
+      </p:cxnSp>
+      <p:cxnSp>
+        <p:nvCxnSpPr>
+          <p:cNvPr id="9" name="直線單箭頭接點 8">
+            <a:extLst>
+              <a:ext uri="{FF2B5EF4-FFF2-40B4-BE49-F238E27FC236}">
+                <a16:creationId xmlns:a16="http://schemas.microsoft.com/office/drawing/2014/main" id="{2AF045E6-818A-F8ED-3C16-E14CF7D6CCF4}"/>
+              </a:ext>
+            </a:extLst>
+          </p:cNvPr>
+          <p:cNvCxnSpPr/>
+          <p:nvPr/>
+        </p:nvCxnSpPr>
+        <p:spPr>
+          <a:xfrm flipV="1">
+            <a:off x="3249385" y="1436914"/>
+            <a:ext cx="0" cy="1036864"/>
+          </a:xfrm>
+          <a:prstGeom prst="straightConnector1">
+            <a:avLst/>
+          </a:prstGeom>
+          <a:ln>
+            <a:solidFill>
+              <a:srgbClr val="FF0000"/>
+            </a:solidFill>
+            <a:tailEnd type="triangle"/>
+          </a:ln>
+        </p:spPr>
+        <p:style>
+          <a:lnRef idx="1">
+            <a:schemeClr val="accent1"/>
+          </a:lnRef>
+          <a:fillRef idx="0">
+            <a:schemeClr val="accent1"/>
+          </a:fillRef>
+          <a:effectRef idx="0">
+            <a:schemeClr val="accent1"/>
+          </a:effectRef>
+          <a:fontRef idx="minor">
+            <a:schemeClr val="tx1"/>
+          </a:fontRef>
+        </p:style>
+      </p:cxnSp>
+      <p:cxnSp>
+        <p:nvCxnSpPr>
+          <p:cNvPr id="10" name="直線單箭頭接點 9">
+            <a:extLst>
+              <a:ext uri="{FF2B5EF4-FFF2-40B4-BE49-F238E27FC236}">
+                <a16:creationId xmlns:a16="http://schemas.microsoft.com/office/drawing/2014/main" id="{87C8F3BA-0500-CE58-407D-02DCDB02D5D8}"/>
+              </a:ext>
+            </a:extLst>
+          </p:cNvPr>
+          <p:cNvCxnSpPr/>
+          <p:nvPr/>
+        </p:nvCxnSpPr>
+        <p:spPr>
+          <a:xfrm flipV="1">
+            <a:off x="3532414" y="1436914"/>
+            <a:ext cx="0" cy="1036864"/>
+          </a:xfrm>
+          <a:prstGeom prst="straightConnector1">
+            <a:avLst/>
+          </a:prstGeom>
+          <a:ln>
+            <a:solidFill>
+              <a:srgbClr val="FF0000"/>
+            </a:solidFill>
+            <a:tailEnd type="triangle"/>
+          </a:ln>
+        </p:spPr>
+        <p:style>
+          <a:lnRef idx="1">
+            <a:schemeClr val="accent1"/>
+          </a:lnRef>
+          <a:fillRef idx="0">
+            <a:schemeClr val="accent1"/>
+          </a:fillRef>
+          <a:effectRef idx="0">
+            <a:schemeClr val="accent1"/>
+          </a:effectRef>
+          <a:fontRef idx="minor">
+            <a:schemeClr val="tx1"/>
+          </a:fontRef>
+        </p:style>
+      </p:cxnSp>
+      <p:cxnSp>
+        <p:nvCxnSpPr>
+          <p:cNvPr id="11" name="直線單箭頭接點 10">
+            <a:extLst>
+              <a:ext uri="{FF2B5EF4-FFF2-40B4-BE49-F238E27FC236}">
+                <a16:creationId xmlns:a16="http://schemas.microsoft.com/office/drawing/2014/main" id="{AC124F57-CBF1-9479-1B2C-0F248413542A}"/>
+              </a:ext>
+            </a:extLst>
+          </p:cNvPr>
+          <p:cNvCxnSpPr/>
+          <p:nvPr/>
+        </p:nvCxnSpPr>
+        <p:spPr>
+          <a:xfrm flipV="1">
+            <a:off x="3848099" y="1436914"/>
+            <a:ext cx="0" cy="1036864"/>
+          </a:xfrm>
+          <a:prstGeom prst="straightConnector1">
+            <a:avLst/>
+          </a:prstGeom>
+          <a:ln>
+            <a:solidFill>
+              <a:srgbClr val="FF0000"/>
+            </a:solidFill>
+            <a:tailEnd type="triangle"/>
+          </a:ln>
+        </p:spPr>
+        <p:style>
+          <a:lnRef idx="1">
+            <a:schemeClr val="accent1"/>
+          </a:lnRef>
+          <a:fillRef idx="0">
+            <a:schemeClr val="accent1"/>
+          </a:fillRef>
+          <a:effectRef idx="0">
+            <a:schemeClr val="accent1"/>
+          </a:effectRef>
+          <a:fontRef idx="minor">
+            <a:schemeClr val="tx1"/>
+          </a:fontRef>
+        </p:style>
+      </p:cxnSp>
+      <p:cxnSp>
+        <p:nvCxnSpPr>
+          <p:cNvPr id="12" name="直線單箭頭接點 11">
+            <a:extLst>
+              <a:ext uri="{FF2B5EF4-FFF2-40B4-BE49-F238E27FC236}">
+                <a16:creationId xmlns:a16="http://schemas.microsoft.com/office/drawing/2014/main" id="{A21DAF36-6520-97EF-53F1-9A3A4038E28A}"/>
+              </a:ext>
+            </a:extLst>
+          </p:cNvPr>
+          <p:cNvCxnSpPr/>
+          <p:nvPr/>
+        </p:nvCxnSpPr>
+        <p:spPr>
+          <a:xfrm flipV="1">
+            <a:off x="4188278" y="1436914"/>
+            <a:ext cx="0" cy="1036864"/>
+          </a:xfrm>
+          <a:prstGeom prst="straightConnector1">
+            <a:avLst/>
+          </a:prstGeom>
+          <a:ln>
+            <a:solidFill>
+              <a:srgbClr val="FF0000"/>
+            </a:solidFill>
+            <a:tailEnd type="triangle"/>
+          </a:ln>
+        </p:spPr>
+        <p:style>
+          <a:lnRef idx="1">
+            <a:schemeClr val="accent1"/>
+          </a:lnRef>
+          <a:fillRef idx="0">
+            <a:schemeClr val="accent1"/>
+          </a:fillRef>
+          <a:effectRef idx="0">
+            <a:schemeClr val="accent1"/>
+          </a:effectRef>
+          <a:fontRef idx="minor">
+            <a:schemeClr val="tx1"/>
+          </a:fontRef>
+        </p:style>
+      </p:cxnSp>
+      <p:cxnSp>
+        <p:nvCxnSpPr>
+          <p:cNvPr id="13" name="直線單箭頭接點 12">
+            <a:extLst>
+              <a:ext uri="{FF2B5EF4-FFF2-40B4-BE49-F238E27FC236}">
+                <a16:creationId xmlns:a16="http://schemas.microsoft.com/office/drawing/2014/main" id="{2B58655D-F94B-C30A-93BD-CF63F3DB3DB7}"/>
+              </a:ext>
+            </a:extLst>
+          </p:cNvPr>
+          <p:cNvCxnSpPr/>
+          <p:nvPr/>
+        </p:nvCxnSpPr>
+        <p:spPr>
+          <a:xfrm flipV="1">
+            <a:off x="4544785" y="1436914"/>
+            <a:ext cx="0" cy="1036864"/>
+          </a:xfrm>
+          <a:prstGeom prst="straightConnector1">
+            <a:avLst/>
+          </a:prstGeom>
+          <a:ln>
+            <a:solidFill>
+              <a:srgbClr val="FF0000"/>
+            </a:solidFill>
+            <a:tailEnd type="triangle"/>
+          </a:ln>
+        </p:spPr>
+        <p:style>
+          <a:lnRef idx="1">
+            <a:schemeClr val="accent1"/>
+          </a:lnRef>
+          <a:fillRef idx="0">
+            <a:schemeClr val="accent1"/>
+          </a:fillRef>
+          <a:effectRef idx="0">
+            <a:schemeClr val="accent1"/>
+          </a:effectRef>
+          <a:fontRef idx="minor">
+            <a:schemeClr val="tx1"/>
+          </a:fontRef>
+        </p:style>
+      </p:cxnSp>
+      <p:cxnSp>
+        <p:nvCxnSpPr>
+          <p:cNvPr id="14" name="直線單箭頭接點 13">
+            <a:extLst>
+              <a:ext uri="{FF2B5EF4-FFF2-40B4-BE49-F238E27FC236}">
+                <a16:creationId xmlns:a16="http://schemas.microsoft.com/office/drawing/2014/main" id="{82CBAB5E-5693-49B3-59F9-17206DF91B95}"/>
+              </a:ext>
+            </a:extLst>
+          </p:cNvPr>
+          <p:cNvCxnSpPr/>
+          <p:nvPr/>
+        </p:nvCxnSpPr>
+        <p:spPr>
+          <a:xfrm flipV="1">
+            <a:off x="4917621" y="1436914"/>
+            <a:ext cx="0" cy="1036864"/>
+          </a:xfrm>
+          <a:prstGeom prst="straightConnector1">
+            <a:avLst/>
+          </a:prstGeom>
+          <a:ln>
+            <a:solidFill>
+              <a:srgbClr val="FF0000"/>
+            </a:solidFill>
+            <a:tailEnd type="triangle"/>
+          </a:ln>
+        </p:spPr>
+        <p:style>
+          <a:lnRef idx="1">
+            <a:schemeClr val="accent1"/>
+          </a:lnRef>
+          <a:fillRef idx="0">
+            <a:schemeClr val="accent1"/>
+          </a:fillRef>
+          <a:effectRef idx="0">
+            <a:schemeClr val="accent1"/>
+          </a:effectRef>
+          <a:fontRef idx="minor">
+            <a:schemeClr val="tx1"/>
+          </a:fontRef>
+        </p:style>
+      </p:cxnSp>
+      <p:pic>
+        <p:nvPicPr>
+          <p:cNvPr id="16" name="圖片 15">
+            <a:extLst>
+              <a:ext uri="{FF2B5EF4-FFF2-40B4-BE49-F238E27FC236}">
+                <a16:creationId xmlns:a16="http://schemas.microsoft.com/office/drawing/2014/main" id="{40B616CF-277D-B901-9DE4-951E8DE78444}"/>
+              </a:ext>
+            </a:extLst>
+          </p:cNvPr>
+          <p:cNvPicPr>
+            <a:picLocks noChangeAspect="1"/>
+          </p:cNvPicPr>
+          <p:nvPr/>
+        </p:nvPicPr>
+        <p:blipFill>
+          <a:blip r:embed="rId3"/>
+          <a:stretch>
+            <a:fillRect/>
+          </a:stretch>
+        </p:blipFill>
+        <p:spPr>
+          <a:xfrm>
+            <a:off x="6098721" y="374109"/>
+            <a:ext cx="2394178" cy="4395282"/>
+          </a:xfrm>
+          <a:prstGeom prst="rect">
+            <a:avLst/>
+          </a:prstGeom>
+        </p:spPr>
+      </p:pic>
+    </p:spTree>
+    <p:extLst>
+      <p:ext uri="{BB962C8B-B14F-4D97-AF65-F5344CB8AC3E}">
+        <p14:creationId xmlns:p14="http://schemas.microsoft.com/office/powerpoint/2010/main" val="2037670605"/>
+      </p:ext>
+    </p:extLst>
+  </p:cSld>
+  <p:clrMapOvr>
+    <a:masterClrMapping/>
+  </p:clrMapOvr>
+</p:sld>
+</file>
+
+<file path=ppt/slides/slide24.xml><?xml version="1.0" encoding="utf-8"?>
+<p:sld xmlns:a="http://schemas.openxmlformats.org/drawingml/2006/main" xmlns:r="http://schemas.openxmlformats.org/officeDocument/2006/relationships" xmlns:p="http://schemas.openxmlformats.org/presentationml/2006/main">
+  <p:cSld>
+    <p:spTree>
+      <p:nvGrpSpPr>
+        <p:cNvPr id="1" name=""/>
+        <p:cNvGrpSpPr/>
+        <p:nvPr/>
+      </p:nvGrpSpPr>
+      <p:grpSpPr>
+        <a:xfrm>
+          <a:off x="0" y="0"/>
+          <a:ext cx="0" cy="0"/>
+          <a:chOff x="0" y="0"/>
+          <a:chExt cx="0" cy="0"/>
+        </a:xfrm>
+      </p:grpSpPr>
+      <p:sp>
+        <p:nvSpPr>
+          <p:cNvPr id="2" name="標題 1">
+            <a:extLst>
+              <a:ext uri="{FF2B5EF4-FFF2-40B4-BE49-F238E27FC236}">
+                <a16:creationId xmlns:a16="http://schemas.microsoft.com/office/drawing/2014/main" id="{5A0DB592-40E5-08C3-FB9F-E34600231992}"/>
+              </a:ext>
+            </a:extLst>
+          </p:cNvPr>
+          <p:cNvSpPr>
+            <a:spLocks noGrp="1"/>
+          </p:cNvSpPr>
+          <p:nvPr>
+            <p:ph type="title"/>
+          </p:nvPr>
+        </p:nvSpPr>
+        <p:spPr/>
+        <p:txBody>
+          <a:bodyPr/>
+          <a:lstStyle/>
+          <a:p>
+            <a:endParaRPr lang="zh-TW" altLang="en-US"/>
+          </a:p>
+        </p:txBody>
+      </p:sp>
+      <p:sp>
+        <p:nvSpPr>
+          <p:cNvPr id="3" name="文字版面配置區 2">
+            <a:extLst>
+              <a:ext uri="{FF2B5EF4-FFF2-40B4-BE49-F238E27FC236}">
+                <a16:creationId xmlns:a16="http://schemas.microsoft.com/office/drawing/2014/main" id="{9DBCB5AE-6CEF-DF45-5A81-B2B9A69BF7B3}"/>
+              </a:ext>
+            </a:extLst>
+          </p:cNvPr>
+          <p:cNvSpPr>
+            <a:spLocks noGrp="1"/>
+          </p:cNvSpPr>
+          <p:nvPr>
+            <p:ph type="body" idx="1"/>
+          </p:nvPr>
+        </p:nvSpPr>
+        <p:spPr/>
+        <p:txBody>
+          <a:bodyPr/>
+          <a:lstStyle/>
+          <a:p>
+            <a:endParaRPr lang="zh-TW" altLang="en-US"/>
+          </a:p>
+        </p:txBody>
+      </p:sp>
+      <p:pic>
+        <p:nvPicPr>
+          <p:cNvPr id="5" name="圖片 4">
+            <a:extLst>
+              <a:ext uri="{FF2B5EF4-FFF2-40B4-BE49-F238E27FC236}">
+                <a16:creationId xmlns:a16="http://schemas.microsoft.com/office/drawing/2014/main" id="{F0A53131-F47C-D568-5ECD-CC782BAD3DAC}"/>
+              </a:ext>
+            </a:extLst>
+          </p:cNvPr>
+          <p:cNvPicPr>
+            <a:picLocks noChangeAspect="1"/>
+          </p:cNvPicPr>
+          <p:nvPr/>
+        </p:nvPicPr>
+        <p:blipFill>
+          <a:blip r:embed="rId2"/>
+          <a:stretch>
+            <a:fillRect/>
+          </a:stretch>
+        </p:blipFill>
+        <p:spPr>
+          <a:xfrm>
+            <a:off x="661987" y="452437"/>
+            <a:ext cx="7820025" cy="4238625"/>
+          </a:xfrm>
+          <a:prstGeom prst="rect">
+            <a:avLst/>
+          </a:prstGeom>
+        </p:spPr>
+      </p:pic>
+    </p:spTree>
+    <p:extLst>
+      <p:ext uri="{BB962C8B-B14F-4D97-AF65-F5344CB8AC3E}">
+        <p14:creationId xmlns:p14="http://schemas.microsoft.com/office/powerpoint/2010/main" val="3570644977"/>
+      </p:ext>
+    </p:extLst>
+  </p:cSld>
+  <p:clrMapOvr>
+    <a:masterClrMapping/>
+  </p:clrMapOvr>
+</p:sld>
+</file>
+
+<file path=ppt/slides/slide25.xml><?xml version="1.0" encoding="utf-8"?>
+<p:sld xmlns:a="http://schemas.openxmlformats.org/drawingml/2006/main" xmlns:r="http://schemas.openxmlformats.org/officeDocument/2006/relationships" xmlns:p="http://schemas.openxmlformats.org/presentationml/2006/main">
+  <p:cSld>
+    <p:spTree>
+      <p:nvGrpSpPr>
+        <p:cNvPr id="1" name=""/>
+        <p:cNvGrpSpPr/>
+        <p:nvPr/>
+      </p:nvGrpSpPr>
+      <p:grpSpPr>
+        <a:xfrm>
+          <a:off x="0" y="0"/>
+          <a:ext cx="0" cy="0"/>
+          <a:chOff x="0" y="0"/>
+          <a:chExt cx="0" cy="0"/>
+        </a:xfrm>
+      </p:grpSpPr>
+      <p:sp>
+        <p:nvSpPr>
+          <p:cNvPr id="2" name="標題 1">
+            <a:extLst>
+              <a:ext uri="{FF2B5EF4-FFF2-40B4-BE49-F238E27FC236}">
+                <a16:creationId xmlns:a16="http://schemas.microsoft.com/office/drawing/2014/main" id="{6C59595D-144B-5BC2-B688-8C48D471EC98}"/>
+              </a:ext>
+            </a:extLst>
+          </p:cNvPr>
+          <p:cNvSpPr>
+            <a:spLocks noGrp="1"/>
+          </p:cNvSpPr>
+          <p:nvPr>
+            <p:ph type="title"/>
+          </p:nvPr>
+        </p:nvSpPr>
+        <p:spPr/>
+        <p:txBody>
+          <a:bodyPr/>
+          <a:lstStyle/>
+          <a:p>
+            <a:endParaRPr lang="zh-TW" altLang="en-US"/>
+          </a:p>
+        </p:txBody>
+      </p:sp>
+      <p:sp>
+        <p:nvSpPr>
+          <p:cNvPr id="3" name="文字版面配置區 2">
+            <a:extLst>
+              <a:ext uri="{FF2B5EF4-FFF2-40B4-BE49-F238E27FC236}">
+                <a16:creationId xmlns:a16="http://schemas.microsoft.com/office/drawing/2014/main" id="{F73025E8-6E9E-C1C1-B318-5A97918520FB}"/>
+              </a:ext>
+            </a:extLst>
+          </p:cNvPr>
+          <p:cNvSpPr>
+            <a:spLocks noGrp="1"/>
+          </p:cNvSpPr>
+          <p:nvPr>
+            <p:ph type="body" idx="1"/>
+          </p:nvPr>
+        </p:nvSpPr>
+        <p:spPr/>
+        <p:txBody>
+          <a:bodyPr/>
+          <a:lstStyle/>
+          <a:p>
+            <a:endParaRPr lang="zh-TW" altLang="en-US"/>
+          </a:p>
+        </p:txBody>
+      </p:sp>
+      <p:pic>
+        <p:nvPicPr>
+          <p:cNvPr id="3074" name="Picture 2" descr="preview">
+            <a:extLst>
+              <a:ext uri="{FF2B5EF4-FFF2-40B4-BE49-F238E27FC236}">
+                <a16:creationId xmlns:a16="http://schemas.microsoft.com/office/drawing/2014/main" id="{E6EC9849-C809-6EA4-ACD2-BD175430CD25}"/>
+              </a:ext>
+            </a:extLst>
+          </p:cNvPr>
+          <p:cNvPicPr>
+            <a:picLocks noChangeAspect="1" noChangeArrowheads="1"/>
+          </p:cNvPicPr>
+          <p:nvPr/>
+        </p:nvPicPr>
+        <p:blipFill>
+          <a:blip r:embed="rId3">
+            <a:extLst>
+              <a:ext uri="{28A0092B-C50C-407E-A947-70E740481C1C}">
+                <a14:useLocalDpi xmlns:a14="http://schemas.microsoft.com/office/drawing/2010/main" val="0"/>
+              </a:ext>
+            </a:extLst>
+          </a:blip>
+          <a:srcRect/>
+          <a:stretch>
+            <a:fillRect/>
+          </a:stretch>
+        </p:blipFill>
+        <p:spPr bwMode="auto">
+          <a:xfrm>
+            <a:off x="0" y="112713"/>
+            <a:ext cx="9144000" cy="4918075"/>
+          </a:xfrm>
+          <a:prstGeom prst="rect">
+            <a:avLst/>
+          </a:prstGeom>
+          <a:noFill/>
+          <a:extLst>
+            <a:ext uri="{909E8E84-426E-40DD-AFC4-6F175D3DCCD1}">
+              <a14:hiddenFill xmlns:a14="http://schemas.microsoft.com/office/drawing/2010/main">
+                <a:solidFill>
+                  <a:srgbClr val="FFFFFF"/>
+                </a:solidFill>
+              </a14:hiddenFill>
+            </a:ext>
+          </a:extLst>
+        </p:spPr>
+      </p:pic>
+    </p:spTree>
+    <p:extLst>
+      <p:ext uri="{BB962C8B-B14F-4D97-AF65-F5344CB8AC3E}">
+        <p14:creationId xmlns:p14="http://schemas.microsoft.com/office/powerpoint/2010/main" val="2294879927"/>
+      </p:ext>
+    </p:extLst>
+  </p:cSld>
+  <p:clrMapOvr>
+    <a:masterClrMapping/>
+  </p:clrMapOvr>
+</p:sld>
+</file>
+
+<file path=ppt/slides/slide26.xml><?xml version="1.0" encoding="utf-8"?>
+<p:sld xmlns:a="http://schemas.openxmlformats.org/drawingml/2006/main" xmlns:r="http://schemas.openxmlformats.org/officeDocument/2006/relationships" xmlns:p="http://schemas.openxmlformats.org/presentationml/2006/main">
+  <p:cSld>
+    <p:spTree>
+      <p:nvGrpSpPr>
+        <p:cNvPr id="1" name=""/>
+        <p:cNvGrpSpPr/>
+        <p:nvPr/>
+      </p:nvGrpSpPr>
+      <p:grpSpPr>
+        <a:xfrm>
+          <a:off x="0" y="0"/>
+          <a:ext cx="0" cy="0"/>
+          <a:chOff x="0" y="0"/>
+          <a:chExt cx="0" cy="0"/>
+        </a:xfrm>
+      </p:grpSpPr>
+      <p:sp>
+        <p:nvSpPr>
+          <p:cNvPr id="2" name="標題 1">
+            <a:extLst>
+              <a:ext uri="{FF2B5EF4-FFF2-40B4-BE49-F238E27FC236}">
+                <a16:creationId xmlns:a16="http://schemas.microsoft.com/office/drawing/2014/main" id="{B1AB1BC9-8409-4E07-0404-03C398E2DBB0}"/>
+              </a:ext>
+            </a:extLst>
+          </p:cNvPr>
+          <p:cNvSpPr>
+            <a:spLocks noGrp="1"/>
+          </p:cNvSpPr>
+          <p:nvPr>
+            <p:ph type="title"/>
+          </p:nvPr>
+        </p:nvSpPr>
+        <p:spPr/>
+        <p:txBody>
+          <a:bodyPr/>
+          <a:lstStyle/>
+          <a:p>
+            <a:endParaRPr lang="zh-TW" altLang="en-US"/>
+          </a:p>
+        </p:txBody>
+      </p:sp>
+      <p:sp>
+        <p:nvSpPr>
+          <p:cNvPr id="3" name="文字版面配置區 2">
+            <a:extLst>
+              <a:ext uri="{FF2B5EF4-FFF2-40B4-BE49-F238E27FC236}">
+                <a16:creationId xmlns:a16="http://schemas.microsoft.com/office/drawing/2014/main" id="{FBBBC1C4-97F2-76CD-938E-0D8726C6F9A5}"/>
+              </a:ext>
+            </a:extLst>
+          </p:cNvPr>
+          <p:cNvSpPr>
+            <a:spLocks noGrp="1"/>
+          </p:cNvSpPr>
+          <p:nvPr>
+            <p:ph type="body" idx="1"/>
+          </p:nvPr>
+        </p:nvSpPr>
+        <p:spPr/>
+        <p:txBody>
+          <a:bodyPr/>
+          <a:lstStyle/>
+          <a:p>
+            <a:endParaRPr lang="zh-TW" altLang="en-US"/>
+          </a:p>
+        </p:txBody>
+      </p:sp>
+      <p:pic>
+        <p:nvPicPr>
+          <p:cNvPr id="5" name="圖片 4">
+            <a:extLst>
+              <a:ext uri="{FF2B5EF4-FFF2-40B4-BE49-F238E27FC236}">
+                <a16:creationId xmlns:a16="http://schemas.microsoft.com/office/drawing/2014/main" id="{B6F35699-B995-CE25-86DC-A8607C6F4345}"/>
+              </a:ext>
+            </a:extLst>
+          </p:cNvPr>
+          <p:cNvPicPr>
+            <a:picLocks noChangeAspect="1"/>
+          </p:cNvPicPr>
+          <p:nvPr/>
+        </p:nvPicPr>
+        <p:blipFill>
+          <a:blip r:embed="rId2"/>
+          <a:stretch>
+            <a:fillRect/>
+          </a:stretch>
+        </p:blipFill>
+        <p:spPr>
+          <a:xfrm>
+            <a:off x="386138" y="0"/>
+            <a:ext cx="8371723" cy="5143500"/>
+          </a:xfrm>
+          <a:prstGeom prst="rect">
+            <a:avLst/>
+          </a:prstGeom>
+        </p:spPr>
+      </p:pic>
+    </p:spTree>
+    <p:extLst>
+      <p:ext uri="{BB962C8B-B14F-4D97-AF65-F5344CB8AC3E}">
+        <p14:creationId xmlns:p14="http://schemas.microsoft.com/office/powerpoint/2010/main" val="677924073"/>
+      </p:ext>
+    </p:extLst>
+  </p:cSld>
+  <p:clrMapOvr>
+    <a:masterClrMapping/>
+  </p:clrMapOvr>
+</p:sld>
+</file>
+
+<file path=ppt/slides/slide27.xml><?xml version="1.0" encoding="utf-8"?>
+<p:sld xmlns:a="http://schemas.openxmlformats.org/drawingml/2006/main" xmlns:r="http://schemas.openxmlformats.org/officeDocument/2006/relationships" xmlns:p="http://schemas.openxmlformats.org/presentationml/2006/main">
+  <p:cSld>
+    <p:spTree>
+      <p:nvGrpSpPr>
+        <p:cNvPr id="1" name=""/>
+        <p:cNvGrpSpPr/>
+        <p:nvPr/>
+      </p:nvGrpSpPr>
+      <p:grpSpPr>
+        <a:xfrm>
+          <a:off x="0" y="0"/>
+          <a:ext cx="0" cy="0"/>
+          <a:chOff x="0" y="0"/>
+          <a:chExt cx="0" cy="0"/>
+        </a:xfrm>
+      </p:grpSpPr>
+      <p:sp>
+        <p:nvSpPr>
+          <p:cNvPr id="2" name="標題 1">
+            <a:extLst>
+              <a:ext uri="{FF2B5EF4-FFF2-40B4-BE49-F238E27FC236}">
+                <a16:creationId xmlns:a16="http://schemas.microsoft.com/office/drawing/2014/main" id="{089D194A-D386-A27B-7216-FE58BF6B3A09}"/>
+              </a:ext>
+            </a:extLst>
+          </p:cNvPr>
+          <p:cNvSpPr>
+            <a:spLocks noGrp="1"/>
+          </p:cNvSpPr>
+          <p:nvPr>
+            <p:ph type="title"/>
+          </p:nvPr>
+        </p:nvSpPr>
+        <p:spPr/>
+        <p:txBody>
+          <a:bodyPr/>
+          <a:lstStyle/>
+          <a:p>
+            <a:endParaRPr lang="zh-TW" altLang="en-US"/>
+          </a:p>
+        </p:txBody>
+      </p:sp>
+      <p:sp>
+        <p:nvSpPr>
+          <p:cNvPr id="3" name="文字版面配置區 2">
+            <a:extLst>
+              <a:ext uri="{FF2B5EF4-FFF2-40B4-BE49-F238E27FC236}">
+                <a16:creationId xmlns:a16="http://schemas.microsoft.com/office/drawing/2014/main" id="{5097822C-615E-A86C-E523-1CC0A60A8D68}"/>
+              </a:ext>
+            </a:extLst>
+          </p:cNvPr>
+          <p:cNvSpPr>
+            <a:spLocks noGrp="1"/>
+          </p:cNvSpPr>
+          <p:nvPr>
+            <p:ph type="body" idx="1"/>
+          </p:nvPr>
+        </p:nvSpPr>
+        <p:spPr/>
+        <p:txBody>
+          <a:bodyPr/>
+          <a:lstStyle/>
+          <a:p>
+            <a:endParaRPr lang="zh-TW" altLang="en-US" dirty="0"/>
+          </a:p>
+        </p:txBody>
+      </p:sp>
+      <p:pic>
+        <p:nvPicPr>
+          <p:cNvPr id="1026" name="Picture 2">
+            <a:extLst>
+              <a:ext uri="{FF2B5EF4-FFF2-40B4-BE49-F238E27FC236}">
+                <a16:creationId xmlns:a16="http://schemas.microsoft.com/office/drawing/2014/main" id="{637D8F32-66A2-A5BC-633B-BCC0B30BB71E}"/>
+              </a:ext>
+            </a:extLst>
+          </p:cNvPr>
+          <p:cNvPicPr>
+            <a:picLocks noChangeAspect="1" noChangeArrowheads="1"/>
+          </p:cNvPicPr>
+          <p:nvPr/>
+        </p:nvPicPr>
+        <p:blipFill>
+          <a:blip r:embed="rId2">
+            <a:extLst>
+              <a:ext uri="{28A0092B-C50C-407E-A947-70E740481C1C}">
+                <a14:useLocalDpi xmlns:a14="http://schemas.microsoft.com/office/drawing/2010/main" val="0"/>
+              </a:ext>
+            </a:extLst>
+          </a:blip>
+          <a:srcRect/>
+          <a:stretch>
+            <a:fillRect/>
+          </a:stretch>
+        </p:blipFill>
+        <p:spPr bwMode="auto">
+          <a:xfrm>
+            <a:off x="277585" y="510777"/>
+            <a:ext cx="8347510" cy="3489723"/>
+          </a:xfrm>
+          <a:prstGeom prst="rect">
+            <a:avLst/>
+          </a:prstGeom>
+          <a:noFill/>
+          <a:extLst>
+            <a:ext uri="{909E8E84-426E-40DD-AFC4-6F175D3DCCD1}">
+              <a14:hiddenFill xmlns:a14="http://schemas.microsoft.com/office/drawing/2010/main">
+                <a:solidFill>
+                  <a:srgbClr val="FFFFFF"/>
+                </a:solidFill>
+              </a14:hiddenFill>
+            </a:ext>
+          </a:extLst>
+        </p:spPr>
+      </p:pic>
+    </p:spTree>
+    <p:extLst>
+      <p:ext uri="{BB962C8B-B14F-4D97-AF65-F5344CB8AC3E}">
+        <p14:creationId xmlns:p14="http://schemas.microsoft.com/office/powerpoint/2010/main" val="3241825390"/>
+      </p:ext>
+    </p:extLst>
+  </p:cSld>
+  <p:clrMapOvr>
+    <a:masterClrMapping/>
+  </p:clrMapOvr>
+</p:sld>
+</file>
+
+<file path=ppt/slides/slide28.xml><?xml version="1.0" encoding="utf-8"?>
+<p:sld xmlns:a="http://schemas.openxmlformats.org/drawingml/2006/main" xmlns:r="http://schemas.openxmlformats.org/officeDocument/2006/relationships" xmlns:p="http://schemas.openxmlformats.org/presentationml/2006/main">
+  <p:cSld>
+    <p:spTree>
+      <p:nvGrpSpPr>
+        <p:cNvPr id="1" name=""/>
+        <p:cNvGrpSpPr/>
+        <p:nvPr/>
+      </p:nvGrpSpPr>
+      <p:grpSpPr>
+        <a:xfrm>
+          <a:off x="0" y="0"/>
+          <a:ext cx="0" cy="0"/>
+          <a:chOff x="0" y="0"/>
+          <a:chExt cx="0" cy="0"/>
+        </a:xfrm>
+      </p:grpSpPr>
+      <p:sp>
+        <p:nvSpPr>
+          <p:cNvPr id="2" name="標題 1">
+            <a:extLst>
+              <a:ext uri="{FF2B5EF4-FFF2-40B4-BE49-F238E27FC236}">
+                <a16:creationId xmlns:a16="http://schemas.microsoft.com/office/drawing/2014/main" id="{7F0590D8-FFAD-835A-3C41-08E963BA8181}"/>
+              </a:ext>
+            </a:extLst>
+          </p:cNvPr>
+          <p:cNvSpPr>
+            <a:spLocks noGrp="1"/>
+          </p:cNvSpPr>
+          <p:nvPr>
+            <p:ph type="title"/>
+          </p:nvPr>
+        </p:nvSpPr>
+        <p:spPr/>
+        <p:txBody>
+          <a:bodyPr/>
+          <a:lstStyle/>
+          <a:p>
+            <a:endParaRPr lang="zh-TW" altLang="en-US"/>
+          </a:p>
+        </p:txBody>
+      </p:sp>
+      <p:pic>
+        <p:nvPicPr>
+          <p:cNvPr id="2050" name="Picture 2" descr="Knowledge Distillation : Simplified | by Prakhar Ganesh ...">
+            <a:extLst>
+              <a:ext uri="{FF2B5EF4-FFF2-40B4-BE49-F238E27FC236}">
+                <a16:creationId xmlns:a16="http://schemas.microsoft.com/office/drawing/2014/main" id="{59D011E7-73D0-303E-DA63-540E1939840A}"/>
+              </a:ext>
+            </a:extLst>
+          </p:cNvPr>
+          <p:cNvPicPr>
+            <a:picLocks noChangeAspect="1" noChangeArrowheads="1"/>
+          </p:cNvPicPr>
+          <p:nvPr/>
+        </p:nvPicPr>
+        <p:blipFill>
+          <a:blip r:embed="rId3">
+            <a:extLst>
+              <a:ext uri="{28A0092B-C50C-407E-A947-70E740481C1C}">
+                <a14:useLocalDpi xmlns:a14="http://schemas.microsoft.com/office/drawing/2010/main" val="0"/>
+              </a:ext>
+            </a:extLst>
+          </a:blip>
+          <a:srcRect/>
+          <a:stretch>
+            <a:fillRect/>
+          </a:stretch>
+        </p:blipFill>
+        <p:spPr bwMode="auto">
+          <a:xfrm>
+            <a:off x="996042" y="489856"/>
+            <a:ext cx="6912090" cy="4253594"/>
+          </a:xfrm>
+          <a:prstGeom prst="rect">
+            <a:avLst/>
+          </a:prstGeom>
+          <a:noFill/>
+          <a:extLst>
+            <a:ext uri="{909E8E84-426E-40DD-AFC4-6F175D3DCCD1}">
+              <a14:hiddenFill xmlns:a14="http://schemas.microsoft.com/office/drawing/2010/main">
+                <a:solidFill>
+                  <a:srgbClr val="FFFFFF"/>
+                </a:solidFill>
+              </a14:hiddenFill>
+            </a:ext>
+          </a:extLst>
+        </p:spPr>
+      </p:pic>
+    </p:spTree>
+    <p:extLst>
+      <p:ext uri="{BB962C8B-B14F-4D97-AF65-F5344CB8AC3E}">
+        <p14:creationId xmlns:p14="http://schemas.microsoft.com/office/powerpoint/2010/main" val="3457522804"/>
+      </p:ext>
+    </p:extLst>
+  </p:cSld>
+  <p:clrMapOvr>
+    <a:masterClrMapping/>
+  </p:clrMapOvr>
+</p:sld>
+</file>
+
+<file path=ppt/slides/slide29.xml><?xml version="1.0" encoding="utf-8"?>
+<p:sld xmlns:a="http://schemas.openxmlformats.org/drawingml/2006/main" xmlns:r="http://schemas.openxmlformats.org/officeDocument/2006/relationships" xmlns:p="http://schemas.openxmlformats.org/presentationml/2006/main">
+  <p:cSld>
+    <p:spTree>
+      <p:nvGrpSpPr>
+        <p:cNvPr id="1" name="Shape 139"/>
+        <p:cNvGrpSpPr/>
+        <p:nvPr/>
+      </p:nvGrpSpPr>
+      <p:grpSpPr>
+        <a:xfrm>
+          <a:off x="0" y="0"/>
+          <a:ext cx="0" cy="0"/>
+          <a:chOff x="0" y="0"/>
+          <a:chExt cx="0" cy="0"/>
+        </a:xfrm>
+      </p:grpSpPr>
+      <p:cxnSp>
+        <p:nvCxnSpPr>
+          <p:cNvPr id="140" name="Google Shape;140;p26"/>
+          <p:cNvCxnSpPr/>
+          <p:nvPr/>
+        </p:nvCxnSpPr>
+        <p:spPr>
+          <a:xfrm rot="10800000">
+            <a:off x="471906" y="672952"/>
+            <a:ext cx="8200200" cy="0"/>
+          </a:xfrm>
+          <a:prstGeom prst="straightConnector1">
+            <a:avLst/>
+          </a:prstGeom>
+          <a:noFill/>
+          <a:ln w="38100" cap="flat" cmpd="sng">
+            <a:solidFill>
+              <a:srgbClr val="08244A"/>
+            </a:solidFill>
+            <a:prstDash val="solid"/>
+            <a:miter lim="800000"/>
+            <a:headEnd type="none" w="sm" len="sm"/>
+            <a:tailEnd type="none" w="sm" len="sm"/>
+          </a:ln>
+        </p:spPr>
+      </p:cxnSp>
+      <p:sp>
+        <p:nvSpPr>
+          <p:cNvPr id="141" name="Google Shape;141;p26"/>
+          <p:cNvSpPr txBox="1"/>
+          <p:nvPr/>
+        </p:nvSpPr>
+        <p:spPr>
+          <a:xfrm>
+            <a:off x="4312990" y="4919588"/>
+            <a:ext cx="518100" cy="238500"/>
+          </a:xfrm>
+          <a:prstGeom prst="rect">
+            <a:avLst/>
+          </a:prstGeom>
+          <a:solidFill>
+            <a:srgbClr val="08244A"/>
+          </a:solidFill>
+          <a:ln>
+            <a:noFill/>
+          </a:ln>
+        </p:spPr>
+        <p:txBody>
+          <a:bodyPr spcFirstLastPara="1" wrap="square" lIns="68575" tIns="34275" rIns="68575" bIns="34275" anchor="t" anchorCtr="0">
+            <a:spAutoFit/>
+          </a:bodyPr>
+          <a:lstStyle/>
+          <a:p>
+            <a:pPr marL="0" marR="0" lvl="0" indent="0" algn="ctr" rtl="0">
+              <a:spcBef>
+                <a:spcPts val="0"/>
+              </a:spcBef>
+              <a:spcAft>
+                <a:spcPts val="0"/>
+              </a:spcAft>
+              <a:buNone/>
+            </a:pPr>
+            <a:endParaRPr sz="1100">
+              <a:solidFill>
+                <a:schemeClr val="lt1"/>
+              </a:solidFill>
+              <a:latin typeface="Arial"/>
+              <a:ea typeface="Arial"/>
+              <a:cs typeface="Arial"/>
+              <a:sym typeface="Arial"/>
+            </a:endParaRPr>
+          </a:p>
+        </p:txBody>
+      </p:sp>
+      <p:sp>
+        <p:nvSpPr>
+          <p:cNvPr id="142" name="Google Shape;142;p26"/>
+          <p:cNvSpPr txBox="1"/>
+          <p:nvPr/>
+        </p:nvSpPr>
+        <p:spPr>
+          <a:xfrm>
+            <a:off x="7422919" y="4868275"/>
+            <a:ext cx="1660500" cy="238500"/>
+          </a:xfrm>
+          <a:prstGeom prst="rect">
+            <a:avLst/>
+          </a:prstGeom>
+          <a:noFill/>
+          <a:ln>
+            <a:noFill/>
+          </a:ln>
+        </p:spPr>
+        <p:txBody>
+          <a:bodyPr spcFirstLastPara="1" wrap="square" lIns="68575" tIns="34275" rIns="68575" bIns="34275" anchor="t" anchorCtr="0">
+            <a:spAutoFit/>
+          </a:bodyPr>
+          <a:lstStyle/>
+          <a:p>
+            <a:pPr marL="0" marR="0" lvl="0" indent="0" algn="r" rtl="0">
+              <a:spcBef>
+                <a:spcPts val="0"/>
+              </a:spcBef>
+              <a:spcAft>
+                <a:spcPts val="0"/>
+              </a:spcAft>
+              <a:buNone/>
+            </a:pPr>
+            <a:r>
+              <a:rPr lang="zh-TW" sz="1100">
+                <a:solidFill>
+                  <a:srgbClr val="A5A5A5"/>
+                </a:solidFill>
+                <a:latin typeface="Consolas"/>
+                <a:ea typeface="Consolas"/>
+                <a:cs typeface="Consolas"/>
+                <a:sym typeface="Consolas"/>
+              </a:rPr>
+              <a:t>NTUST GAMELab</a:t>
+            </a:r>
+            <a:endParaRPr sz="1100">
+              <a:solidFill>
+                <a:srgbClr val="A5A5A5"/>
+              </a:solidFill>
+              <a:latin typeface="Consolas"/>
+              <a:ea typeface="Consolas"/>
+              <a:cs typeface="Consolas"/>
+              <a:sym typeface="Consolas"/>
+            </a:endParaRPr>
+          </a:p>
+        </p:txBody>
+      </p:sp>
+      <p:sp>
+        <p:nvSpPr>
+          <p:cNvPr id="143" name="Google Shape;143;p26"/>
+          <p:cNvSpPr txBox="1">
+            <a:spLocks noGrp="1"/>
+          </p:cNvSpPr>
+          <p:nvPr>
+            <p:ph type="sldNum" idx="12"/>
+          </p:nvPr>
+        </p:nvSpPr>
+        <p:spPr>
+          <a:xfrm>
+            <a:off x="3543300" y="4904660"/>
+            <a:ext cx="2057400" cy="273900"/>
+          </a:xfrm>
+          <a:prstGeom prst="rect">
+            <a:avLst/>
+          </a:prstGeom>
+          <a:noFill/>
+          <a:ln>
+            <a:noFill/>
+          </a:ln>
+        </p:spPr>
+        <p:txBody>
+          <a:bodyPr spcFirstLastPara="1" wrap="square" lIns="68575" tIns="34275" rIns="68575" bIns="34275" anchor="ctr" anchorCtr="0">
+            <a:noAutofit/>
+          </a:bodyPr>
+          <a:lstStyle/>
+          <a:p>
+            <a:pPr marL="0" lvl="0" indent="0" algn="ctr" rtl="0">
+              <a:spcBef>
+                <a:spcPts val="0"/>
+              </a:spcBef>
+              <a:spcAft>
+                <a:spcPts val="0"/>
+              </a:spcAft>
+              <a:buNone/>
+            </a:pPr>
+            <a:fld id="{00000000-1234-1234-1234-123412341234}" type="slidenum">
+              <a:rPr lang="en-US" altLang="zh-TW" sz="1100"/>
+              <a:t>29</a:t>
+            </a:fld>
+            <a:endParaRPr sz="1100"/>
+          </a:p>
+        </p:txBody>
+      </p:sp>
+      <p:sp>
+        <p:nvSpPr>
+          <p:cNvPr id="2" name="Google Shape;144;p26">
+            <a:extLst>
+              <a:ext uri="{FF2B5EF4-FFF2-40B4-BE49-F238E27FC236}">
+                <a16:creationId xmlns:a16="http://schemas.microsoft.com/office/drawing/2014/main" id="{A3B0841E-3B28-04DA-3AA1-724BDFFD2D21}"/>
+              </a:ext>
+            </a:extLst>
+          </p:cNvPr>
+          <p:cNvSpPr txBox="1"/>
+          <p:nvPr/>
+        </p:nvSpPr>
+        <p:spPr>
+          <a:xfrm>
+            <a:off x="368599" y="246125"/>
+            <a:ext cx="8045355" cy="392385"/>
+          </a:xfrm>
+          <a:prstGeom prst="rect">
+            <a:avLst/>
+          </a:prstGeom>
+          <a:noFill/>
+          <a:ln>
+            <a:noFill/>
+          </a:ln>
+        </p:spPr>
+        <p:txBody>
+          <a:bodyPr spcFirstLastPara="1" wrap="square" lIns="68575" tIns="34275" rIns="68575" bIns="34275" anchor="t" anchorCtr="0">
+            <a:spAutoFit/>
+          </a:bodyPr>
+          <a:lstStyle/>
+          <a:p>
+            <a:pPr marL="0" marR="0" lvl="0" indent="0" algn="l" rtl="0">
+              <a:spcBef>
+                <a:spcPts val="0"/>
+              </a:spcBef>
+              <a:spcAft>
+                <a:spcPts val="0"/>
+              </a:spcAft>
+              <a:buNone/>
+            </a:pPr>
+            <a:r>
+              <a:rPr lang="zh-TW" altLang="en-US" sz="2100" b="1" dirty="0">
+                <a:solidFill>
+                  <a:srgbClr val="08244A"/>
+                </a:solidFill>
+                <a:latin typeface="Microsoft JhengHei"/>
+                <a:ea typeface="Microsoft JhengHei"/>
+                <a:cs typeface="Microsoft JhengHei"/>
+                <a:sym typeface="Microsoft JhengHei"/>
+              </a:rPr>
+              <a:t>碩論預期方向</a:t>
+            </a:r>
+            <a:endParaRPr lang="en-US" sz="2100" b="1" dirty="0">
+              <a:solidFill>
+                <a:srgbClr val="08244A"/>
+              </a:solidFill>
+              <a:latin typeface="Microsoft JhengHei"/>
+              <a:ea typeface="Microsoft JhengHei"/>
+              <a:cs typeface="Microsoft JhengHei"/>
+              <a:sym typeface="Microsoft JhengHei"/>
+            </a:endParaRPr>
+          </a:p>
+        </p:txBody>
+      </p:sp>
+      <p:sp>
+        <p:nvSpPr>
+          <p:cNvPr id="4" name="文字方塊 3">
+            <a:extLst>
+              <a:ext uri="{FF2B5EF4-FFF2-40B4-BE49-F238E27FC236}">
+                <a16:creationId xmlns:a16="http://schemas.microsoft.com/office/drawing/2014/main" id="{8E58FF95-9061-E340-3212-7DFA53283374}"/>
+              </a:ext>
+            </a:extLst>
+          </p:cNvPr>
+          <p:cNvSpPr txBox="1"/>
+          <p:nvPr/>
+        </p:nvSpPr>
+        <p:spPr>
+          <a:xfrm>
+            <a:off x="168986" y="1096156"/>
+            <a:ext cx="8288008" cy="3780522"/>
+          </a:xfrm>
+          <a:prstGeom prst="rect">
+            <a:avLst/>
+          </a:prstGeom>
+          <a:noFill/>
+        </p:spPr>
+        <p:txBody>
+          <a:bodyPr wrap="square" numCol="1" rtlCol="0">
+            <a:spAutoFit/>
+          </a:bodyPr>
+          <a:lstStyle/>
+          <a:p>
+            <a:pPr marL="139700" lvl="0" rtl="0">
+              <a:lnSpc>
+                <a:spcPct val="150000"/>
+              </a:lnSpc>
+              <a:spcBef>
+                <a:spcPts val="0"/>
+              </a:spcBef>
+              <a:spcAft>
+                <a:spcPts val="0"/>
+              </a:spcAft>
+              <a:buClr>
+                <a:schemeClr val="dk1"/>
+              </a:buClr>
+              <a:buSzPts val="1400"/>
+            </a:pPr>
+            <a:r>
+              <a:rPr lang="en-US" altLang="zh-TW" sz="1800" dirty="0">
+                <a:solidFill>
+                  <a:schemeClr val="tx1"/>
+                </a:solidFill>
+                <a:latin typeface="+mj-lt"/>
+              </a:rPr>
+              <a:t>1.Slot </a:t>
+            </a:r>
+            <a:r>
+              <a:rPr lang="zh-TW" altLang="en-US" sz="1800" dirty="0">
+                <a:solidFill>
+                  <a:schemeClr val="tx1"/>
+                </a:solidFill>
+                <a:latin typeface="+mj-lt"/>
+              </a:rPr>
+              <a:t>影片辨識</a:t>
+            </a:r>
+            <a:r>
+              <a:rPr lang="en-US" altLang="zh-TW" sz="1800" dirty="0">
+                <a:solidFill>
+                  <a:schemeClr val="tx1"/>
+                </a:solidFill>
+                <a:latin typeface="+mj-lt"/>
+              </a:rPr>
+              <a:t> </a:t>
+            </a:r>
+          </a:p>
+          <a:p>
+            <a:pPr marL="139700" lvl="1">
+              <a:lnSpc>
+                <a:spcPct val="150000"/>
+              </a:lnSpc>
+              <a:buClr>
+                <a:schemeClr val="dk1"/>
+              </a:buClr>
+              <a:buSzPts val="1400"/>
+            </a:pPr>
+            <a:r>
+              <a:rPr lang="en-US" altLang="zh-TW" sz="1800" dirty="0">
+                <a:solidFill>
+                  <a:schemeClr val="tx1"/>
+                </a:solidFill>
+                <a:latin typeface="+mj-lt"/>
+              </a:rPr>
+              <a:t>     a)</a:t>
+            </a:r>
+            <a:r>
+              <a:rPr lang="zh-TW" altLang="en-US" sz="1800" dirty="0">
+                <a:solidFill>
+                  <a:schemeClr val="tx1"/>
+                </a:solidFill>
+                <a:latin typeface="+mj-lt"/>
+              </a:rPr>
+              <a:t>辨識流程與</a:t>
+            </a:r>
+            <a:r>
+              <a:rPr lang="en-US" altLang="zh-TW" sz="1800" dirty="0">
+                <a:solidFill>
+                  <a:schemeClr val="tx1"/>
+                </a:solidFill>
+                <a:latin typeface="+mj-lt"/>
+              </a:rPr>
+              <a:t>UI</a:t>
+            </a:r>
+            <a:r>
+              <a:rPr lang="zh-TW" altLang="en-US" sz="1800" dirty="0">
+                <a:solidFill>
+                  <a:schemeClr val="tx1"/>
+                </a:solidFill>
+                <a:latin typeface="+mj-lt"/>
+              </a:rPr>
+              <a:t>系統建置</a:t>
+            </a:r>
+            <a:endParaRPr lang="en-US" altLang="zh-TW" sz="1800" dirty="0">
+              <a:solidFill>
+                <a:schemeClr val="tx1"/>
+              </a:solidFill>
+              <a:latin typeface="+mj-lt"/>
+            </a:endParaRPr>
+          </a:p>
+          <a:p>
+            <a:pPr marL="139700" lvl="1">
+              <a:lnSpc>
+                <a:spcPct val="150000"/>
+              </a:lnSpc>
+              <a:buClr>
+                <a:schemeClr val="dk1"/>
+              </a:buClr>
+              <a:buSzPts val="1400"/>
+            </a:pPr>
+            <a:r>
+              <a:rPr lang="en-US" altLang="zh-TW" sz="1800" dirty="0">
+                <a:solidFill>
+                  <a:schemeClr val="tx1"/>
+                </a:solidFill>
+                <a:latin typeface="+mj-lt"/>
+              </a:rPr>
+              <a:t>     b)</a:t>
+            </a:r>
+            <a:r>
+              <a:rPr lang="zh-TW" altLang="en-US" sz="1800" dirty="0">
+                <a:solidFill>
+                  <a:schemeClr val="tx1"/>
+                </a:solidFill>
+                <a:latin typeface="+mj-lt"/>
+              </a:rPr>
+              <a:t>各項目模型交叉測試</a:t>
+            </a:r>
+            <a:endParaRPr lang="en-US" altLang="zh-TW" sz="1800" dirty="0">
+              <a:solidFill>
+                <a:schemeClr val="tx1"/>
+              </a:solidFill>
+              <a:latin typeface="+mj-lt"/>
+            </a:endParaRPr>
+          </a:p>
+          <a:p>
+            <a:pPr marL="139700" lvl="1">
+              <a:lnSpc>
+                <a:spcPct val="150000"/>
+              </a:lnSpc>
+              <a:buClr>
+                <a:schemeClr val="dk1"/>
+              </a:buClr>
+              <a:buSzPts val="1400"/>
+            </a:pPr>
+            <a:r>
+              <a:rPr lang="en-US" altLang="zh-TW" sz="1800" dirty="0">
+                <a:solidFill>
+                  <a:schemeClr val="tx1"/>
+                </a:solidFill>
+                <a:latin typeface="+mj-lt"/>
+              </a:rPr>
+              <a:t>       </a:t>
+            </a:r>
+            <a:r>
+              <a:rPr lang="en-US" altLang="zh-TW" sz="1800" dirty="0">
+                <a:solidFill>
+                  <a:schemeClr val="tx1"/>
+                </a:solidFill>
+                <a:latin typeface="+mj-lt"/>
+                <a:sym typeface="Wingdings" panose="05000000000000000000" pitchFamily="2" charset="2"/>
+              </a:rPr>
+              <a:t></a:t>
+            </a:r>
+            <a:r>
+              <a:rPr lang="zh-TW" altLang="en-US" sz="1800" dirty="0">
+                <a:solidFill>
+                  <a:schemeClr val="tx1"/>
+                </a:solidFill>
+                <a:latin typeface="+mj-lt"/>
+              </a:rPr>
+              <a:t>找出可自動找出最佳模型組合</a:t>
+            </a:r>
+            <a:endParaRPr lang="en-US" altLang="zh-TW" sz="1800" dirty="0">
+              <a:solidFill>
+                <a:schemeClr val="tx1"/>
+              </a:solidFill>
+              <a:latin typeface="+mj-lt"/>
+            </a:endParaRPr>
+          </a:p>
+          <a:p>
+            <a:pPr marL="139700" lvl="1">
+              <a:lnSpc>
+                <a:spcPct val="150000"/>
+              </a:lnSpc>
+              <a:buClr>
+                <a:schemeClr val="dk1"/>
+              </a:buClr>
+              <a:buSzPts val="1400"/>
+            </a:pPr>
+            <a:r>
+              <a:rPr lang="zh-TW" altLang="en-US" sz="1800" dirty="0">
+                <a:solidFill>
+                  <a:schemeClr val="tx1"/>
+                </a:solidFill>
+                <a:latin typeface="+mj-lt"/>
+                <a:sym typeface="Wingdings" panose="05000000000000000000" pitchFamily="2" charset="2"/>
+              </a:rPr>
+              <a:t>       </a:t>
+            </a:r>
+            <a:r>
+              <a:rPr lang="en-US" altLang="zh-TW" sz="1800" dirty="0">
+                <a:solidFill>
+                  <a:schemeClr val="tx1"/>
+                </a:solidFill>
+                <a:latin typeface="+mj-lt"/>
+                <a:sym typeface="Wingdings" panose="05000000000000000000" pitchFamily="2" charset="2"/>
+              </a:rPr>
+              <a:t></a:t>
+            </a:r>
+            <a:r>
+              <a:rPr lang="zh-TW" altLang="en-US" sz="1800" dirty="0">
+                <a:solidFill>
+                  <a:schemeClr val="tx1"/>
+                </a:solidFill>
+                <a:latin typeface="+mj-lt"/>
+                <a:sym typeface="Wingdings" panose="05000000000000000000" pitchFamily="2" charset="2"/>
+              </a:rPr>
+              <a:t>提出新的模型架構</a:t>
+            </a:r>
+            <a:endParaRPr lang="en-US" altLang="zh-TW" sz="1800" dirty="0">
+              <a:solidFill>
+                <a:schemeClr val="tx1"/>
+              </a:solidFill>
+              <a:latin typeface="+mj-lt"/>
+              <a:sym typeface="Wingdings" panose="05000000000000000000" pitchFamily="2" charset="2"/>
+            </a:endParaRPr>
+          </a:p>
+          <a:p>
+            <a:pPr marL="139700" lvl="1">
+              <a:lnSpc>
+                <a:spcPct val="150000"/>
+              </a:lnSpc>
+              <a:buClr>
+                <a:schemeClr val="dk1"/>
+              </a:buClr>
+              <a:buSzPts val="1400"/>
+            </a:pPr>
+            <a:r>
+              <a:rPr lang="en-US" altLang="zh-TW" sz="1800" dirty="0">
+                <a:solidFill>
+                  <a:schemeClr val="tx1"/>
+                </a:solidFill>
+                <a:latin typeface="+mj-lt"/>
+                <a:sym typeface="Wingdings" panose="05000000000000000000" pitchFamily="2" charset="2"/>
+              </a:rPr>
+              <a:t>2.</a:t>
+            </a:r>
+            <a:r>
+              <a:rPr lang="zh-TW" altLang="en-US" sz="1800" dirty="0">
+                <a:solidFill>
+                  <a:schemeClr val="tx1"/>
+                </a:solidFill>
+                <a:latin typeface="+mj-lt"/>
+                <a:sym typeface="Wingdings" panose="05000000000000000000" pitchFamily="2" charset="2"/>
+              </a:rPr>
+              <a:t>分群特徵分析</a:t>
+            </a:r>
+            <a:endParaRPr lang="en-US" altLang="zh-TW" sz="1800" dirty="0">
+              <a:solidFill>
+                <a:schemeClr val="tx1"/>
+              </a:solidFill>
+              <a:latin typeface="+mj-lt"/>
+              <a:sym typeface="Wingdings" panose="05000000000000000000" pitchFamily="2" charset="2"/>
+            </a:endParaRPr>
+          </a:p>
+          <a:p>
+            <a:pPr marL="139700" lvl="1">
+              <a:lnSpc>
+                <a:spcPct val="150000"/>
+              </a:lnSpc>
+              <a:buClr>
+                <a:schemeClr val="dk1"/>
+              </a:buClr>
+              <a:buSzPts val="1400"/>
+            </a:pPr>
+            <a:r>
+              <a:rPr lang="zh-TW" altLang="en-US" sz="1800" dirty="0">
+                <a:solidFill>
+                  <a:schemeClr val="tx1"/>
+                </a:solidFill>
+                <a:latin typeface="+mj-lt"/>
+                <a:sym typeface="Wingdings" panose="05000000000000000000" pitchFamily="2" charset="2"/>
+              </a:rPr>
+              <a:t>    </a:t>
+            </a:r>
+            <a:r>
+              <a:rPr lang="en-US" altLang="zh-TW" sz="1800" dirty="0">
+                <a:solidFill>
+                  <a:schemeClr val="tx1"/>
+                </a:solidFill>
+                <a:latin typeface="+mj-lt"/>
+                <a:sym typeface="Wingdings" panose="05000000000000000000" pitchFamily="2" charset="2"/>
+              </a:rPr>
+              <a:t>)</a:t>
+            </a:r>
+            <a:r>
+              <a:rPr lang="zh-TW" altLang="en-US" sz="1800" dirty="0">
+                <a:solidFill>
+                  <a:schemeClr val="tx1"/>
+                </a:solidFill>
+                <a:latin typeface="+mj-lt"/>
+                <a:sym typeface="Wingdings" panose="05000000000000000000" pitchFamily="2" charset="2"/>
+              </a:rPr>
+              <a:t>最佳化</a:t>
+            </a:r>
+            <a:r>
+              <a:rPr lang="en-US" altLang="zh-TW" sz="1800" dirty="0">
+                <a:solidFill>
+                  <a:schemeClr val="tx1"/>
+                </a:solidFill>
+                <a:latin typeface="+mj-lt"/>
+                <a:sym typeface="Wingdings" panose="05000000000000000000" pitchFamily="2" charset="2"/>
+              </a:rPr>
+              <a:t>Slot</a:t>
+            </a:r>
+            <a:r>
+              <a:rPr lang="zh-TW" altLang="en-US" sz="1800" dirty="0">
+                <a:solidFill>
+                  <a:schemeClr val="tx1"/>
+                </a:solidFill>
+                <a:latin typeface="+mj-lt"/>
+                <a:sym typeface="Wingdings" panose="05000000000000000000" pitchFamily="2" charset="2"/>
+              </a:rPr>
+              <a:t> </a:t>
+            </a:r>
+            <a:r>
+              <a:rPr lang="en-US" altLang="zh-TW" sz="1800" dirty="0">
+                <a:solidFill>
+                  <a:schemeClr val="tx1"/>
+                </a:solidFill>
+                <a:latin typeface="+mj-lt"/>
+                <a:sym typeface="Wingdings" panose="05000000000000000000" pitchFamily="2" charset="2"/>
+              </a:rPr>
+              <a:t>Symbol</a:t>
+            </a:r>
+            <a:r>
+              <a:rPr lang="zh-TW" altLang="en-US" sz="1800" dirty="0">
+                <a:solidFill>
+                  <a:schemeClr val="tx1"/>
+                </a:solidFill>
+                <a:latin typeface="+mj-lt"/>
+                <a:sym typeface="Wingdings" panose="05000000000000000000" pitchFamily="2" charset="2"/>
+              </a:rPr>
+              <a:t>特徵</a:t>
+            </a:r>
+            <a:endParaRPr lang="en-US" altLang="zh-TW" sz="1800" dirty="0">
+              <a:solidFill>
+                <a:schemeClr val="tx1"/>
+              </a:solidFill>
+              <a:latin typeface="+mj-lt"/>
+              <a:sym typeface="Wingdings" panose="05000000000000000000" pitchFamily="2" charset="2"/>
+            </a:endParaRPr>
+          </a:p>
+          <a:p>
+            <a:pPr marL="139700" lvl="1">
+              <a:lnSpc>
+                <a:spcPct val="150000"/>
+              </a:lnSpc>
+              <a:buClr>
+                <a:schemeClr val="dk1"/>
+              </a:buClr>
+              <a:buSzPts val="1400"/>
+            </a:pPr>
+            <a:r>
+              <a:rPr lang="zh-TW" altLang="en-US" sz="1800" dirty="0">
+                <a:solidFill>
+                  <a:schemeClr val="tx1"/>
+                </a:solidFill>
+                <a:latin typeface="+mj-lt"/>
+                <a:sym typeface="Wingdings" panose="05000000000000000000" pitchFamily="2" charset="2"/>
+              </a:rPr>
+              <a:t>    </a:t>
+            </a:r>
+            <a:r>
+              <a:rPr lang="en-US" altLang="zh-TW" sz="1800" dirty="0">
+                <a:solidFill>
+                  <a:schemeClr val="tx1"/>
+                </a:solidFill>
+                <a:latin typeface="+mj-lt"/>
+                <a:sym typeface="Wingdings" panose="05000000000000000000" pitchFamily="2" charset="2"/>
+              </a:rPr>
+              <a:t>)</a:t>
+            </a:r>
+            <a:r>
+              <a:rPr lang="zh-TW" altLang="en-US" sz="1800" dirty="0">
+                <a:solidFill>
+                  <a:schemeClr val="tx1"/>
+                </a:solidFill>
+                <a:latin typeface="+mj-lt"/>
+                <a:sym typeface="Wingdings" panose="05000000000000000000" pitchFamily="2" charset="2"/>
+              </a:rPr>
+              <a:t>最佳化</a:t>
+            </a:r>
+            <a:r>
+              <a:rPr lang="en-US" altLang="zh-TW" sz="1800" dirty="0">
+                <a:solidFill>
+                  <a:schemeClr val="tx1"/>
+                </a:solidFill>
+                <a:latin typeface="+mj-lt"/>
+                <a:sym typeface="Wingdings" panose="05000000000000000000" pitchFamily="2" charset="2"/>
+              </a:rPr>
+              <a:t>ImageNet</a:t>
+            </a:r>
+            <a:r>
+              <a:rPr lang="zh-TW" altLang="en-US" sz="1800" dirty="0">
+                <a:solidFill>
+                  <a:schemeClr val="tx1"/>
+                </a:solidFill>
+                <a:latin typeface="+mj-lt"/>
+                <a:sym typeface="Wingdings" panose="05000000000000000000" pitchFamily="2" charset="2"/>
+              </a:rPr>
+              <a:t>特徵</a:t>
+            </a:r>
+            <a:endParaRPr lang="en-US" altLang="zh-TW" sz="1800" dirty="0">
+              <a:solidFill>
+                <a:schemeClr val="tx1"/>
+              </a:solidFill>
+              <a:latin typeface="+mj-lt"/>
+            </a:endParaRPr>
+          </a:p>
+          <a:p>
+            <a:pPr marL="482600" lvl="0" indent="-342900" algn="l" rtl="0">
+              <a:lnSpc>
+                <a:spcPct val="150000"/>
+              </a:lnSpc>
+              <a:spcBef>
+                <a:spcPts val="0"/>
+              </a:spcBef>
+              <a:spcAft>
+                <a:spcPts val="0"/>
+              </a:spcAft>
+              <a:buClr>
+                <a:schemeClr val="dk1"/>
+              </a:buClr>
+              <a:buSzPts val="1400"/>
+              <a:buFont typeface="+mj-lt"/>
+              <a:buAutoNum type="arabicPeriod"/>
+            </a:pPr>
+            <a:endParaRPr lang="en-US" altLang="zh-TW" sz="1800" dirty="0">
+              <a:solidFill>
+                <a:schemeClr val="tx1"/>
+              </a:solidFill>
+              <a:latin typeface="+mj-lt"/>
+            </a:endParaRPr>
+          </a:p>
+        </p:txBody>
+      </p:sp>
+    </p:spTree>
+    <p:extLst>
+      <p:ext uri="{BB962C8B-B14F-4D97-AF65-F5344CB8AC3E}">
+        <p14:creationId xmlns:p14="http://schemas.microsoft.com/office/powerpoint/2010/main" val="1560826237"/>
+      </p:ext>
+    </p:extLst>
+  </p:cSld>
+  <p:clrMapOvr>
+    <a:masterClrMapping/>
+  </p:clrMapOvr>
+  <p:transition spd="slow">
+    <p:push/>
+  </p:transition>
+</p:sld>
+</file>
+
 <file path=ppt/slides/slide3.xml><?xml version="1.0" encoding="utf-8"?>
 <p:sld xmlns:a="http://schemas.openxmlformats.org/drawingml/2006/main" xmlns:r="http://schemas.openxmlformats.org/officeDocument/2006/relationships" xmlns:p="http://schemas.openxmlformats.org/presentationml/2006/main">
   <p:cSld>
@@ -26274,7 +28633,7 @@
         <p:spPr>
           <a:xfrm>
             <a:off x="0" y="874138"/>
-            <a:ext cx="9035512" cy="4047262"/>
+            <a:ext cx="9035512" cy="3724096"/>
           </a:xfrm>
           <a:prstGeom prst="rect">
             <a:avLst/>
@@ -26524,15 +28883,18 @@
               </a:rPr>
               <a:t>DeepAug</a:t>
             </a:r>
-            <a:endParaRPr lang="en-US" altLang="zh-TW" dirty="0">
-              <a:solidFill>
-                <a:schemeClr val="tx1"/>
-              </a:solidFill>
-              <a:latin typeface="Microsoft JhengHei"/>
-              <a:ea typeface="Microsoft JhengHei"/>
-              <a:cs typeface="Microsoft JhengHei"/>
-              <a:sym typeface="Microsoft JhengHei"/>
-            </a:endParaRPr>
+            <a:r>
+              <a:rPr lang="en-US" altLang="zh-TW" dirty="0">
+                <a:solidFill>
+                  <a:schemeClr val="tx1"/>
+                </a:solidFill>
+                <a:latin typeface="Microsoft JhengHei"/>
+                <a:ea typeface="Microsoft JhengHei"/>
+                <a:cs typeface="Microsoft JhengHei"/>
+                <a:sym typeface="Microsoft JhengHei"/>
+              </a:rPr>
+              <a:t>+</a:t>
+            </a:r>
           </a:p>
           <a:p>
             <a:pPr marL="482600" lvl="0" indent="-342900" algn="l" rtl="0">
@@ -26565,28 +28927,7 @@
               </a:rPr>
               <a:t>here are now a variety of ImageNet-scale robustness benchmark.</a:t>
             </a:r>
-            <a:br>
-              <a:rPr lang="en-US" altLang="zh-TW" b="0" i="0" dirty="0">
-                <a:effectLst/>
-                <a:latin typeface="Arial" panose="020B0604020202020204" pitchFamily="34" charset="0"/>
-              </a:rPr>
-            </a:br>
-            <a:r>
-              <a:rPr lang="en-US" altLang="zh-TW" b="0" i="0" dirty="0">
-                <a:effectLst/>
-                <a:latin typeface="Arial" panose="020B0604020202020204" pitchFamily="34" charset="0"/>
-              </a:rPr>
-              <a:t>[2, 12, 15]&lt;-</a:t>
-            </a:r>
-            <a:r>
-              <a:rPr lang="zh-TW" altLang="en-US" b="0" i="0" dirty="0">
-                <a:effectLst/>
-                <a:latin typeface="Arial" panose="020B0604020202020204" pitchFamily="34" charset="0"/>
-              </a:rPr>
-              <a:t>待補</a:t>
-            </a:r>
-            <a:endParaRPr lang="en-US" altLang="zh-TW" b="0" i="0" dirty="0">
-              <a:effectLst/>
+            <a:endParaRPr lang="en-US" altLang="zh-TW" dirty="0">
               <a:latin typeface="Arial" panose="020B0604020202020204" pitchFamily="34" charset="0"/>
             </a:endParaRPr>
           </a:p>
@@ -28662,7 +31003,15 @@
                   <a:schemeClr val="tx1"/>
                 </a:solidFill>
               </a:rPr>
-              <a:t>CNN(ResNet50) -&gt;ANT and </a:t>
+              <a:t>CNN(ResNet50) -&gt;ANT </a:t>
+            </a:r>
+            <a:r>
+              <a:rPr lang="zh-TW" altLang="en-US" sz="1800" dirty="0">
+                <a:solidFill>
+                  <a:schemeClr val="tx1"/>
+                </a:solidFill>
+              </a:rPr>
+              <a:t>、</a:t>
             </a:r>
             <a:r>
               <a:rPr lang="en-US" altLang="zh-TW" sz="1800" dirty="0" err="1">
@@ -28670,7 +31019,15 @@
                   <a:schemeClr val="tx1"/>
                 </a:solidFill>
               </a:rPr>
-              <a:t>DeepAug+AugMix</a:t>
+              <a:t>DeepAug</a:t>
+            </a:r>
+            <a:r>
+              <a:rPr lang="en-US" altLang="zh-TW" sz="1800" dirty="0">
+                <a:solidFill>
+                  <a:schemeClr val="tx1"/>
+                </a:solidFill>
+              </a:rPr>
+              <a:t>+</a:t>
             </a:r>
             <a:br>
               <a:rPr lang="en-US" altLang="zh-TW" sz="1800" dirty="0">

</xml_diff>